<commit_message>
Relay class and modul divisions
</commit_message>
<xml_diff>
--- a/Menürendzser.pptx
+++ b/Menürendzser.pptx
@@ -243,7 +243,7 @@
           <a:p>
             <a:fld id="{7520FE40-B5E6-4F63-9BAB-DDB3402A48E9}" type="datetimeFigureOut">
               <a:rPr lang="hu-HU" smtClean="0"/>
-              <a:t>2024. 02. 27.</a:t>
+              <a:t>2024. 03. 02.</a:t>
             </a:fld>
             <a:endParaRPr lang="hu-HU"/>
           </a:p>
@@ -413,7 +413,7 @@
           <a:p>
             <a:fld id="{7520FE40-B5E6-4F63-9BAB-DDB3402A48E9}" type="datetimeFigureOut">
               <a:rPr lang="hu-HU" smtClean="0"/>
-              <a:t>2024. 02. 27.</a:t>
+              <a:t>2024. 03. 02.</a:t>
             </a:fld>
             <a:endParaRPr lang="hu-HU"/>
           </a:p>
@@ -593,7 +593,7 @@
           <a:p>
             <a:fld id="{7520FE40-B5E6-4F63-9BAB-DDB3402A48E9}" type="datetimeFigureOut">
               <a:rPr lang="hu-HU" smtClean="0"/>
-              <a:t>2024. 02. 27.</a:t>
+              <a:t>2024. 03. 02.</a:t>
             </a:fld>
             <a:endParaRPr lang="hu-HU"/>
           </a:p>
@@ -763,7 +763,7 @@
           <a:p>
             <a:fld id="{7520FE40-B5E6-4F63-9BAB-DDB3402A48E9}" type="datetimeFigureOut">
               <a:rPr lang="hu-HU" smtClean="0"/>
-              <a:t>2024. 02. 27.</a:t>
+              <a:t>2024. 03. 02.</a:t>
             </a:fld>
             <a:endParaRPr lang="hu-HU"/>
           </a:p>
@@ -1009,7 +1009,7 @@
           <a:p>
             <a:fld id="{7520FE40-B5E6-4F63-9BAB-DDB3402A48E9}" type="datetimeFigureOut">
               <a:rPr lang="hu-HU" smtClean="0"/>
-              <a:t>2024. 02. 27.</a:t>
+              <a:t>2024. 03. 02.</a:t>
             </a:fld>
             <a:endParaRPr lang="hu-HU"/>
           </a:p>
@@ -1241,7 +1241,7 @@
           <a:p>
             <a:fld id="{7520FE40-B5E6-4F63-9BAB-DDB3402A48E9}" type="datetimeFigureOut">
               <a:rPr lang="hu-HU" smtClean="0"/>
-              <a:t>2024. 02. 27.</a:t>
+              <a:t>2024. 03. 02.</a:t>
             </a:fld>
             <a:endParaRPr lang="hu-HU"/>
           </a:p>
@@ -1608,7 +1608,7 @@
           <a:p>
             <a:fld id="{7520FE40-B5E6-4F63-9BAB-DDB3402A48E9}" type="datetimeFigureOut">
               <a:rPr lang="hu-HU" smtClean="0"/>
-              <a:t>2024. 02. 27.</a:t>
+              <a:t>2024. 03. 02.</a:t>
             </a:fld>
             <a:endParaRPr lang="hu-HU"/>
           </a:p>
@@ -1726,7 +1726,7 @@
           <a:p>
             <a:fld id="{7520FE40-B5E6-4F63-9BAB-DDB3402A48E9}" type="datetimeFigureOut">
               <a:rPr lang="hu-HU" smtClean="0"/>
-              <a:t>2024. 02. 27.</a:t>
+              <a:t>2024. 03. 02.</a:t>
             </a:fld>
             <a:endParaRPr lang="hu-HU"/>
           </a:p>
@@ -1821,7 +1821,7 @@
           <a:p>
             <a:fld id="{7520FE40-B5E6-4F63-9BAB-DDB3402A48E9}" type="datetimeFigureOut">
               <a:rPr lang="hu-HU" smtClean="0"/>
-              <a:t>2024. 02. 27.</a:t>
+              <a:t>2024. 03. 02.</a:t>
             </a:fld>
             <a:endParaRPr lang="hu-HU"/>
           </a:p>
@@ -2098,7 +2098,7 @@
           <a:p>
             <a:fld id="{7520FE40-B5E6-4F63-9BAB-DDB3402A48E9}" type="datetimeFigureOut">
               <a:rPr lang="hu-HU" smtClean="0"/>
-              <a:t>2024. 02. 27.</a:t>
+              <a:t>2024. 03. 02.</a:t>
             </a:fld>
             <a:endParaRPr lang="hu-HU"/>
           </a:p>
@@ -2355,7 +2355,7 @@
           <a:p>
             <a:fld id="{7520FE40-B5E6-4F63-9BAB-DDB3402A48E9}" type="datetimeFigureOut">
               <a:rPr lang="hu-HU" smtClean="0"/>
-              <a:t>2024. 02. 27.</a:t>
+              <a:t>2024. 03. 02.</a:t>
             </a:fld>
             <a:endParaRPr lang="hu-HU"/>
           </a:p>
@@ -2568,7 +2568,7 @@
           <a:p>
             <a:fld id="{7520FE40-B5E6-4F63-9BAB-DDB3402A48E9}" type="datetimeFigureOut">
               <a:rPr lang="hu-HU" smtClean="0"/>
-              <a:t>2024. 02. 27.</a:t>
+              <a:t>2024. 03. 02.</a:t>
             </a:fld>
             <a:endParaRPr lang="hu-HU"/>
           </a:p>
@@ -2987,8 +2987,8 @@
         </p:nvSpPr>
         <p:spPr>
           <a:xfrm>
-            <a:off x="10218584" y="2164080"/>
-            <a:ext cx="425560" cy="2026920"/>
+            <a:off x="10218584" y="327991"/>
+            <a:ext cx="425560" cy="3863009"/>
           </a:xfrm>
           <a:custGeom>
             <a:avLst/>
@@ -3089,8 +3089,8 @@
         </p:nvSpPr>
         <p:spPr>
           <a:xfrm>
-            <a:off x="10217109" y="2915910"/>
-            <a:ext cx="210321" cy="1282700"/>
+            <a:off x="10217109" y="1076325"/>
+            <a:ext cx="178383" cy="3122285"/>
           </a:xfrm>
           <a:custGeom>
             <a:avLst/>
@@ -3713,14 +3713,13 @@
           </p:cNvPr>
           <p:cNvCxnSpPr>
             <a:cxnSpLocks/>
-            <a:endCxn id="7" idx="2"/>
           </p:cNvCxnSpPr>
           <p:nvPr/>
         </p:nvCxnSpPr>
         <p:spPr>
-          <a:xfrm flipV="1">
-            <a:off x="11100274" y="1813539"/>
-            <a:ext cx="835067" cy="2471782"/>
+          <a:xfrm flipH="1" flipV="1">
+            <a:off x="11077421" y="1813936"/>
+            <a:ext cx="22853" cy="2471385"/>
           </a:xfrm>
           <a:prstGeom prst="straightConnector1">
             <a:avLst/>
@@ -5089,7 +5088,7 @@
         </p:nvSpPr>
         <p:spPr>
           <a:xfrm>
-            <a:off x="12856785" y="2297767"/>
+            <a:off x="12749534" y="2398957"/>
             <a:ext cx="1332266" cy="430887"/>
           </a:xfrm>
           <a:prstGeom prst="rect">
@@ -5458,7 +5457,7 @@
         </p:blipFill>
         <p:spPr>
           <a:xfrm>
-            <a:off x="8058584" y="2043907"/>
+            <a:off x="8077622" y="187256"/>
             <a:ext cx="2160000" cy="1620000"/>
           </a:xfrm>
           <a:prstGeom prst="rect">
@@ -5477,14 +5476,13 @@
           </p:cNvPr>
           <p:cNvCxnSpPr>
             <a:cxnSpLocks/>
-            <a:endCxn id="113" idx="2"/>
           </p:cNvCxnSpPr>
           <p:nvPr/>
         </p:nvCxnSpPr>
         <p:spPr>
           <a:xfrm flipH="1" flipV="1">
-            <a:off x="9138584" y="3663907"/>
-            <a:ext cx="1015091" cy="621414"/>
+            <a:off x="10158745" y="1807256"/>
+            <a:ext cx="29912" cy="2478065"/>
           </a:xfrm>
           <a:prstGeom prst="straightConnector1">
             <a:avLst/>
@@ -5525,7 +5523,7 @@
         </p:nvSpPr>
         <p:spPr>
           <a:xfrm>
-            <a:off x="9964797" y="3662545"/>
+            <a:off x="10070969" y="3214465"/>
             <a:ext cx="691879" cy="261610"/>
           </a:xfrm>
           <a:prstGeom prst="rect">
@@ -5561,7 +5559,7 @@
         </p:nvSpPr>
         <p:spPr>
           <a:xfrm>
-            <a:off x="10214139" y="2319462"/>
+            <a:off x="10298876" y="2278811"/>
             <a:ext cx="691879" cy="261610"/>
           </a:xfrm>
           <a:prstGeom prst="rect">

</xml_diff>

<commit_message>
Menu class, Display class with static functions
</commit_message>
<xml_diff>
--- a/Menürendzser.pptx
+++ b/Menürendzser.pptx
@@ -243,7 +243,7 @@
           <a:p>
             <a:fld id="{7520FE40-B5E6-4F63-9BAB-DDB3402A48E9}" type="datetimeFigureOut">
               <a:rPr lang="hu-HU" smtClean="0"/>
-              <a:t>2024. 03. 02.</a:t>
+              <a:t>2024. 03. 28.</a:t>
             </a:fld>
             <a:endParaRPr lang="hu-HU"/>
           </a:p>
@@ -413,7 +413,7 @@
           <a:p>
             <a:fld id="{7520FE40-B5E6-4F63-9BAB-DDB3402A48E9}" type="datetimeFigureOut">
               <a:rPr lang="hu-HU" smtClean="0"/>
-              <a:t>2024. 03. 02.</a:t>
+              <a:t>2024. 03. 28.</a:t>
             </a:fld>
             <a:endParaRPr lang="hu-HU"/>
           </a:p>
@@ -593,7 +593,7 @@
           <a:p>
             <a:fld id="{7520FE40-B5E6-4F63-9BAB-DDB3402A48E9}" type="datetimeFigureOut">
               <a:rPr lang="hu-HU" smtClean="0"/>
-              <a:t>2024. 03. 02.</a:t>
+              <a:t>2024. 03. 28.</a:t>
             </a:fld>
             <a:endParaRPr lang="hu-HU"/>
           </a:p>
@@ -763,7 +763,7 @@
           <a:p>
             <a:fld id="{7520FE40-B5E6-4F63-9BAB-DDB3402A48E9}" type="datetimeFigureOut">
               <a:rPr lang="hu-HU" smtClean="0"/>
-              <a:t>2024. 03. 02.</a:t>
+              <a:t>2024. 03. 28.</a:t>
             </a:fld>
             <a:endParaRPr lang="hu-HU"/>
           </a:p>
@@ -1009,7 +1009,7 @@
           <a:p>
             <a:fld id="{7520FE40-B5E6-4F63-9BAB-DDB3402A48E9}" type="datetimeFigureOut">
               <a:rPr lang="hu-HU" smtClean="0"/>
-              <a:t>2024. 03. 02.</a:t>
+              <a:t>2024. 03. 28.</a:t>
             </a:fld>
             <a:endParaRPr lang="hu-HU"/>
           </a:p>
@@ -1241,7 +1241,7 @@
           <a:p>
             <a:fld id="{7520FE40-B5E6-4F63-9BAB-DDB3402A48E9}" type="datetimeFigureOut">
               <a:rPr lang="hu-HU" smtClean="0"/>
-              <a:t>2024. 03. 02.</a:t>
+              <a:t>2024. 03. 28.</a:t>
             </a:fld>
             <a:endParaRPr lang="hu-HU"/>
           </a:p>
@@ -1608,7 +1608,7 @@
           <a:p>
             <a:fld id="{7520FE40-B5E6-4F63-9BAB-DDB3402A48E9}" type="datetimeFigureOut">
               <a:rPr lang="hu-HU" smtClean="0"/>
-              <a:t>2024. 03. 02.</a:t>
+              <a:t>2024. 03. 28.</a:t>
             </a:fld>
             <a:endParaRPr lang="hu-HU"/>
           </a:p>
@@ -1726,7 +1726,7 @@
           <a:p>
             <a:fld id="{7520FE40-B5E6-4F63-9BAB-DDB3402A48E9}" type="datetimeFigureOut">
               <a:rPr lang="hu-HU" smtClean="0"/>
-              <a:t>2024. 03. 02.</a:t>
+              <a:t>2024. 03. 28.</a:t>
             </a:fld>
             <a:endParaRPr lang="hu-HU"/>
           </a:p>
@@ -1821,7 +1821,7 @@
           <a:p>
             <a:fld id="{7520FE40-B5E6-4F63-9BAB-DDB3402A48E9}" type="datetimeFigureOut">
               <a:rPr lang="hu-HU" smtClean="0"/>
-              <a:t>2024. 03. 02.</a:t>
+              <a:t>2024. 03. 28.</a:t>
             </a:fld>
             <a:endParaRPr lang="hu-HU"/>
           </a:p>
@@ -2098,7 +2098,7 @@
           <a:p>
             <a:fld id="{7520FE40-B5E6-4F63-9BAB-DDB3402A48E9}" type="datetimeFigureOut">
               <a:rPr lang="hu-HU" smtClean="0"/>
-              <a:t>2024. 03. 02.</a:t>
+              <a:t>2024. 03. 28.</a:t>
             </a:fld>
             <a:endParaRPr lang="hu-HU"/>
           </a:p>
@@ -2355,7 +2355,7 @@
           <a:p>
             <a:fld id="{7520FE40-B5E6-4F63-9BAB-DDB3402A48E9}" type="datetimeFigureOut">
               <a:rPr lang="hu-HU" smtClean="0"/>
-              <a:t>2024. 03. 02.</a:t>
+              <a:t>2024. 03. 28.</a:t>
             </a:fld>
             <a:endParaRPr lang="hu-HU"/>
           </a:p>
@@ -2568,7 +2568,7 @@
           <a:p>
             <a:fld id="{7520FE40-B5E6-4F63-9BAB-DDB3402A48E9}" type="datetimeFigureOut">
               <a:rPr lang="hu-HU" smtClean="0"/>
-              <a:t>2024. 03. 02.</a:t>
+              <a:t>2024. 03. 28.</a:t>
             </a:fld>
             <a:endParaRPr lang="hu-HU"/>
           </a:p>

</xml_diff>

<commit_message>
Func pointer implemented but not working
</commit_message>
<xml_diff>
--- a/Menürendzser.pptx
+++ b/Menürendzser.pptx
@@ -3176,9 +3176,9 @@
           <p:nvPr/>
         </p:nvSpPr>
         <p:spPr>
-          <a:xfrm>
-            <a:off x="7594600" y="6057900"/>
-            <a:ext cx="1593850" cy="2413000"/>
+          <a:xfrm flipV="1">
+            <a:off x="6354438" y="3394857"/>
+            <a:ext cx="2834012" cy="1699863"/>
           </a:xfrm>
           <a:custGeom>
             <a:avLst/>
@@ -3578,7 +3578,7 @@
       </p:pic>
       <p:pic>
         <p:nvPicPr>
-          <p:cNvPr id="9" name="Kép 8" descr="A képen szöveg, képernyőkép, Betűtípus, szám látható&#10;&#10;Automatikusan generált leírás">
+          <p:cNvPr id="9" name="Kép 8">
             <a:extLst>
               <a:ext uri="{FF2B5EF4-FFF2-40B4-BE49-F238E27FC236}">
                 <a16:creationId xmlns:a16="http://schemas.microsoft.com/office/drawing/2014/main" id="{089AE4D1-D62B-4E6C-6EF8-E7B8571A8018}"/>
@@ -3598,13 +3598,12 @@
               </a:ext>
             </a:extLst>
           </a:blip>
-          <a:stretch>
-            <a:fillRect/>
-          </a:stretch>
+          <a:srcRect/>
+          <a:stretch/>
         </p:blipFill>
         <p:spPr>
           <a:xfrm>
-            <a:off x="8052169" y="6960374"/>
+            <a:off x="6803135" y="2129180"/>
             <a:ext cx="2160000" cy="1620000"/>
           </a:xfrm>
           <a:prstGeom prst="rect">
@@ -3623,14 +3622,14 @@
           </p:cNvPr>
           <p:cNvCxnSpPr>
             <a:cxnSpLocks/>
-            <a:endCxn id="9" idx="0"/>
+            <a:endCxn id="9" idx="3"/>
           </p:cNvCxnSpPr>
           <p:nvPr/>
         </p:nvCxnSpPr>
         <p:spPr>
-          <a:xfrm flipH="1">
-            <a:off x="9132169" y="6171145"/>
-            <a:ext cx="566847" cy="789229"/>
+          <a:xfrm flipH="1" flipV="1">
+            <a:off x="8963135" y="2939180"/>
+            <a:ext cx="557929" cy="1294059"/>
           </a:xfrm>
           <a:prstGeom prst="straightConnector1">
             <a:avLst/>
@@ -3674,7 +3673,7 @@
         </p:nvCxnSpPr>
         <p:spPr>
           <a:xfrm flipH="1">
-            <a:off x="7595852" y="7435850"/>
+            <a:off x="6346818" y="2604656"/>
             <a:ext cx="601998" cy="334524"/>
           </a:xfrm>
           <a:prstGeom prst="straightConnector1">
@@ -3748,7 +3747,7 @@
       </p:cxnSp>
       <p:pic>
         <p:nvPicPr>
-          <p:cNvPr id="32" name="Kép 31" descr="A képen Grafika, kör, Színesség, zöld látható&#10;&#10;Automatikusan generált leírás">
+          <p:cNvPr id="32" name="Kép 31">
             <a:extLst>
               <a:ext uri="{FF2B5EF4-FFF2-40B4-BE49-F238E27FC236}">
                 <a16:creationId xmlns:a16="http://schemas.microsoft.com/office/drawing/2014/main" id="{E71F9EAC-9077-9E1E-7912-67362F323CB6}"/>
@@ -3768,9 +3767,8 @@
               </a:ext>
             </a:extLst>
           </a:blip>
-          <a:stretch>
-            <a:fillRect/>
-          </a:stretch>
+          <a:srcRect/>
+          <a:stretch/>
         </p:blipFill>
         <p:spPr>
           <a:xfrm>
@@ -3828,7 +3826,7 @@
       </p:cxnSp>
       <p:pic>
         <p:nvPicPr>
-          <p:cNvPr id="40" name="Kép 39" descr="A képen szöveg, képernyőkép, Betűtípus, szám látható&#10;&#10;Automatikusan generált leírás">
+          <p:cNvPr id="40" name="Kép 39">
             <a:extLst>
               <a:ext uri="{FF2B5EF4-FFF2-40B4-BE49-F238E27FC236}">
                 <a16:creationId xmlns:a16="http://schemas.microsoft.com/office/drawing/2014/main" id="{36FAA46D-0165-7C49-E9AB-CDA627A6454B}"/>
@@ -3848,9 +3846,8 @@
               </a:ext>
             </a:extLst>
           </a:blip>
-          <a:stretch>
-            <a:fillRect/>
-          </a:stretch>
+          <a:srcRect/>
+          <a:stretch/>
         </p:blipFill>
         <p:spPr>
           <a:xfrm>
@@ -4172,7 +4169,7 @@
       </p:sp>
       <p:pic>
         <p:nvPicPr>
-          <p:cNvPr id="58" name="Kép 57" descr="A képen szöveg, képernyőkép, Betűtípus, szám látható&#10;&#10;Automatikusan generált leírás">
+          <p:cNvPr id="58" name="Kép 57">
             <a:extLst>
               <a:ext uri="{FF2B5EF4-FFF2-40B4-BE49-F238E27FC236}">
                 <a16:creationId xmlns:a16="http://schemas.microsoft.com/office/drawing/2014/main" id="{5E253FB7-30F6-9F27-2DC2-576466FC7229}"/>
@@ -4192,9 +4189,8 @@
               </a:ext>
             </a:extLst>
           </a:blip>
-          <a:stretch>
-            <a:fillRect/>
-          </a:stretch>
+          <a:srcRect/>
+          <a:stretch/>
         </p:blipFill>
         <p:spPr>
           <a:xfrm>
@@ -4360,7 +4356,7 @@
         </p:blipFill>
         <p:spPr>
           <a:xfrm>
-            <a:off x="9800856" y="8630799"/>
+            <a:off x="8456572" y="3666255"/>
             <a:ext cx="433634" cy="433634"/>
           </a:xfrm>
           <a:prstGeom prst="rect">
@@ -4396,7 +4392,7 @@
         </p:blipFill>
         <p:spPr>
           <a:xfrm>
-            <a:off x="9800856" y="8898041"/>
+            <a:off x="8456572" y="3933497"/>
             <a:ext cx="433634" cy="433634"/>
           </a:xfrm>
           <a:prstGeom prst="rect">
@@ -4418,7 +4414,7 @@
         </p:nvSpPr>
         <p:spPr>
           <a:xfrm>
-            <a:off x="10233025" y="8839200"/>
+            <a:off x="8888741" y="3874656"/>
             <a:ext cx="219075" cy="288925"/>
           </a:xfrm>
           <a:custGeom>
@@ -4510,7 +4506,7 @@
         </p:nvSpPr>
         <p:spPr>
           <a:xfrm flipH="1">
-            <a:off x="9581781" y="8844983"/>
+            <a:off x="8237497" y="3880439"/>
             <a:ext cx="219075" cy="288925"/>
           </a:xfrm>
           <a:custGeom>
@@ -4588,50 +4584,6 @@
           </a:p>
         </p:txBody>
       </p:sp>
-      <p:cxnSp>
-        <p:nvCxnSpPr>
-          <p:cNvPr id="72" name="Egyenes összekötő nyíllal 71">
-            <a:extLst>
-              <a:ext uri="{FF2B5EF4-FFF2-40B4-BE49-F238E27FC236}">
-                <a16:creationId xmlns:a16="http://schemas.microsoft.com/office/drawing/2014/main" id="{9215B1B3-D397-69BA-52B8-EC48B191B9E7}"/>
-              </a:ext>
-            </a:extLst>
-          </p:cNvPr>
-          <p:cNvCxnSpPr>
-            <a:cxnSpLocks/>
-          </p:cNvCxnSpPr>
-          <p:nvPr/>
-        </p:nvCxnSpPr>
-        <p:spPr>
-          <a:xfrm>
-            <a:off x="9979819" y="8413738"/>
-            <a:ext cx="35596" cy="342118"/>
-          </a:xfrm>
-          <a:prstGeom prst="straightConnector1">
-            <a:avLst/>
-          </a:prstGeom>
-          <a:ln w="76200">
-            <a:solidFill>
-              <a:srgbClr val="FF0000"/>
-            </a:solidFill>
-            <a:tailEnd type="triangle"/>
-          </a:ln>
-        </p:spPr>
-        <p:style>
-          <a:lnRef idx="3">
-            <a:schemeClr val="dk1"/>
-          </a:lnRef>
-          <a:fillRef idx="0">
-            <a:schemeClr val="dk1"/>
-          </a:fillRef>
-          <a:effectRef idx="2">
-            <a:schemeClr val="dk1"/>
-          </a:effectRef>
-          <a:fontRef idx="minor">
-            <a:schemeClr val="tx1"/>
-          </a:fontRef>
-        </p:style>
-      </p:cxnSp>
       <p:sp>
         <p:nvSpPr>
           <p:cNvPr id="76" name="Szabadkézi sokszög: alakzat 75">
@@ -4736,7 +4688,7 @@
       </p:sp>
       <p:pic>
         <p:nvPicPr>
-          <p:cNvPr id="78" name="Kép 77" descr="A képen szöveg, képernyőkép, Betűtípus, szám látható&#10;&#10;Automatikusan generált leírás">
+          <p:cNvPr id="78" name="Kép 77">
             <a:extLst>
               <a:ext uri="{FF2B5EF4-FFF2-40B4-BE49-F238E27FC236}">
                 <a16:creationId xmlns:a16="http://schemas.microsoft.com/office/drawing/2014/main" id="{F62CBC30-5A57-999D-662C-25DCA82A45FA}"/>
@@ -4756,13 +4708,12 @@
               </a:ext>
             </a:extLst>
           </a:blip>
-          <a:stretch>
-            <a:fillRect/>
-          </a:stretch>
+          <a:srcRect/>
+          <a:stretch/>
         </p:blipFill>
         <p:spPr>
           <a:xfrm>
-            <a:off x="5435852" y="6960374"/>
+            <a:off x="4186818" y="2129180"/>
             <a:ext cx="2160000" cy="1620000"/>
           </a:xfrm>
           <a:prstGeom prst="rect">
@@ -4770,50 +4721,6 @@
           </a:prstGeom>
         </p:spPr>
       </p:pic>
-      <p:cxnSp>
-        <p:nvCxnSpPr>
-          <p:cNvPr id="90" name="Egyenes összekötő nyíllal 89">
-            <a:extLst>
-              <a:ext uri="{FF2B5EF4-FFF2-40B4-BE49-F238E27FC236}">
-                <a16:creationId xmlns:a16="http://schemas.microsoft.com/office/drawing/2014/main" id="{1E772431-243B-EEC6-9CE5-31F61B63F79F}"/>
-              </a:ext>
-            </a:extLst>
-          </p:cNvPr>
-          <p:cNvCxnSpPr>
-            <a:cxnSpLocks/>
-          </p:cNvCxnSpPr>
-          <p:nvPr/>
-        </p:nvCxnSpPr>
-        <p:spPr>
-          <a:xfrm flipV="1">
-            <a:off x="10070969" y="6608365"/>
-            <a:ext cx="0" cy="370285"/>
-          </a:xfrm>
-          <a:prstGeom prst="straightConnector1">
-            <a:avLst/>
-          </a:prstGeom>
-          <a:ln w="76200">
-            <a:solidFill>
-              <a:srgbClr val="52E1E8"/>
-            </a:solidFill>
-            <a:tailEnd type="triangle"/>
-          </a:ln>
-        </p:spPr>
-        <p:style>
-          <a:lnRef idx="3">
-            <a:schemeClr val="dk1"/>
-          </a:lnRef>
-          <a:fillRef idx="0">
-            <a:schemeClr val="dk1"/>
-          </a:fillRef>
-          <a:effectRef idx="2">
-            <a:schemeClr val="dk1"/>
-          </a:effectRef>
-          <a:fontRef idx="minor">
-            <a:schemeClr val="tx1"/>
-          </a:fontRef>
-        </p:style>
-      </p:cxnSp>
       <p:sp>
         <p:nvSpPr>
           <p:cNvPr id="96" name="Szabadkézi sokszög: alakzat 95">
@@ -5196,7 +5103,7 @@
         </p:nvSpPr>
         <p:spPr>
           <a:xfrm>
-            <a:off x="7769364" y="6458342"/>
+            <a:off x="6463078" y="4307737"/>
             <a:ext cx="691879" cy="261610"/>
           </a:xfrm>
           <a:prstGeom prst="rect">
@@ -5215,98 +5122,6 @@
               <a:rPr lang="hu-HU" sz="1100" dirty="0"/>
               <a:t>Mentés</a:t>
             </a:r>
-          </a:p>
-        </p:txBody>
-      </p:sp>
-      <p:sp>
-        <p:nvSpPr>
-          <p:cNvPr id="106" name="Szabadkézi sokszög: alakzat 105">
-            <a:extLst>
-              <a:ext uri="{FF2B5EF4-FFF2-40B4-BE49-F238E27FC236}">
-                <a16:creationId xmlns:a16="http://schemas.microsoft.com/office/drawing/2014/main" id="{6CF23CA9-7DAA-EAEA-6D2A-871E8CC50EDB}"/>
-              </a:ext>
-            </a:extLst>
-          </p:cNvPr>
-          <p:cNvSpPr/>
-          <p:nvPr/>
-        </p:nvSpPr>
-        <p:spPr>
-          <a:xfrm>
-            <a:off x="7454900" y="5829300"/>
-            <a:ext cx="1727200" cy="1117600"/>
-          </a:xfrm>
-          <a:custGeom>
-            <a:avLst/>
-            <a:gdLst>
-              <a:gd name="connsiteX0" fmla="*/ 0 w 1727200"/>
-              <a:gd name="connsiteY0" fmla="*/ 1117600 h 1117600"/>
-              <a:gd name="connsiteX1" fmla="*/ 749300 w 1727200"/>
-              <a:gd name="connsiteY1" fmla="*/ 196850 h 1117600"/>
-              <a:gd name="connsiteX2" fmla="*/ 1727200 w 1727200"/>
-              <a:gd name="connsiteY2" fmla="*/ 0 h 1117600"/>
-            </a:gdLst>
-            <a:ahLst/>
-            <a:cxnLst>
-              <a:cxn ang="0">
-                <a:pos x="connsiteX0" y="connsiteY0"/>
-              </a:cxn>
-              <a:cxn ang="0">
-                <a:pos x="connsiteX1" y="connsiteY1"/>
-              </a:cxn>
-              <a:cxn ang="0">
-                <a:pos x="connsiteX2" y="connsiteY2"/>
-              </a:cxn>
-            </a:cxnLst>
-            <a:rect l="l" t="t" r="r" b="b"/>
-            <a:pathLst>
-              <a:path w="1727200" h="1117600">
-                <a:moveTo>
-                  <a:pt x="0" y="1117600"/>
-                </a:moveTo>
-                <a:cubicBezTo>
-                  <a:pt x="230716" y="750358"/>
-                  <a:pt x="461433" y="383117"/>
-                  <a:pt x="749300" y="196850"/>
-                </a:cubicBezTo>
-                <a:cubicBezTo>
-                  <a:pt x="1037167" y="10583"/>
-                  <a:pt x="1382183" y="5291"/>
-                  <a:pt x="1727200" y="0"/>
-                </a:cubicBezTo>
-              </a:path>
-            </a:pathLst>
-          </a:custGeom>
-          <a:noFill/>
-          <a:ln w="76200">
-            <a:solidFill>
-              <a:srgbClr val="52E1E8"/>
-            </a:solidFill>
-            <a:headEnd type="none" w="med" len="med"/>
-            <a:tailEnd type="triangle" w="med" len="med"/>
-          </a:ln>
-        </p:spPr>
-        <p:style>
-          <a:lnRef idx="2">
-            <a:schemeClr val="accent1">
-              <a:shade val="15000"/>
-            </a:schemeClr>
-          </a:lnRef>
-          <a:fillRef idx="1">
-            <a:schemeClr val="accent1"/>
-          </a:fillRef>
-          <a:effectRef idx="0">
-            <a:schemeClr val="accent1"/>
-          </a:effectRef>
-          <a:fontRef idx="minor">
-            <a:schemeClr val="lt1"/>
-          </a:fontRef>
-        </p:style>
-        <p:txBody>
-          <a:bodyPr rtlCol="0" anchor="ctr"/>
-          <a:lstStyle/>
-          <a:p>
-            <a:pPr algn="ctr"/>
-            <a:endParaRPr lang="hu-HU"/>
           </a:p>
         </p:txBody>
       </p:sp>
@@ -5560,6 +5375,144 @@
         <p:spPr>
           <a:xfrm>
             <a:off x="10298876" y="2278811"/>
+            <a:ext cx="691879" cy="261610"/>
+          </a:xfrm>
+          <a:prstGeom prst="rect">
+            <a:avLst/>
+          </a:prstGeom>
+          <a:noFill/>
+        </p:spPr>
+        <p:txBody>
+          <a:bodyPr wrap="square" rtlCol="0">
+            <a:spAutoFit/>
+          </a:bodyPr>
+          <a:lstStyle/>
+          <a:p>
+            <a:pPr algn="ctr"/>
+            <a:r>
+              <a:rPr lang="hu-HU" sz="1100" dirty="0"/>
+              <a:t>Vissza</a:t>
+            </a:r>
+          </a:p>
+        </p:txBody>
+      </p:sp>
+      <p:sp>
+        <p:nvSpPr>
+          <p:cNvPr id="11" name="Szabadkézi sokszög: alakzat 10">
+            <a:extLst>
+              <a:ext uri="{FF2B5EF4-FFF2-40B4-BE49-F238E27FC236}">
+                <a16:creationId xmlns:a16="http://schemas.microsoft.com/office/drawing/2014/main" id="{1F549D46-3CF1-E85D-92DB-C1B80C91E055}"/>
+              </a:ext>
+            </a:extLst>
+          </p:cNvPr>
+          <p:cNvSpPr/>
+          <p:nvPr/>
+        </p:nvSpPr>
+        <p:spPr>
+          <a:xfrm>
+            <a:off x="8962310" y="2254901"/>
+            <a:ext cx="846172" cy="1943709"/>
+          </a:xfrm>
+          <a:custGeom>
+            <a:avLst/>
+            <a:gdLst>
+              <a:gd name="connsiteX0" fmla="*/ 0 w 323196"/>
+              <a:gd name="connsiteY0" fmla="*/ 0 h 2026920"/>
+              <a:gd name="connsiteX1" fmla="*/ 266700 w 323196"/>
+              <a:gd name="connsiteY1" fmla="*/ 259080 h 2026920"/>
+              <a:gd name="connsiteX2" fmla="*/ 320040 w 323196"/>
+              <a:gd name="connsiteY2" fmla="*/ 1424940 h 2026920"/>
+              <a:gd name="connsiteX3" fmla="*/ 312420 w 323196"/>
+              <a:gd name="connsiteY3" fmla="*/ 2026920 h 2026920"/>
+            </a:gdLst>
+            <a:ahLst/>
+            <a:cxnLst>
+              <a:cxn ang="0">
+                <a:pos x="connsiteX0" y="connsiteY0"/>
+              </a:cxn>
+              <a:cxn ang="0">
+                <a:pos x="connsiteX1" y="connsiteY1"/>
+              </a:cxn>
+              <a:cxn ang="0">
+                <a:pos x="connsiteX2" y="connsiteY2"/>
+              </a:cxn>
+              <a:cxn ang="0">
+                <a:pos x="connsiteX3" y="connsiteY3"/>
+              </a:cxn>
+            </a:cxnLst>
+            <a:rect l="l" t="t" r="r" b="b"/>
+            <a:pathLst>
+              <a:path w="323196" h="2026920">
+                <a:moveTo>
+                  <a:pt x="0" y="0"/>
+                </a:moveTo>
+                <a:cubicBezTo>
+                  <a:pt x="106680" y="10795"/>
+                  <a:pt x="213360" y="21590"/>
+                  <a:pt x="266700" y="259080"/>
+                </a:cubicBezTo>
+                <a:cubicBezTo>
+                  <a:pt x="320040" y="496570"/>
+                  <a:pt x="312420" y="1130300"/>
+                  <a:pt x="320040" y="1424940"/>
+                </a:cubicBezTo>
+                <a:cubicBezTo>
+                  <a:pt x="327660" y="1719580"/>
+                  <a:pt x="320040" y="1873250"/>
+                  <a:pt x="312420" y="2026920"/>
+                </a:cubicBezTo>
+              </a:path>
+            </a:pathLst>
+          </a:custGeom>
+          <a:noFill/>
+          <a:ln w="76200">
+            <a:solidFill>
+              <a:srgbClr val="52E1E8"/>
+            </a:solidFill>
+            <a:headEnd type="none" w="med" len="med"/>
+            <a:tailEnd type="triangle" w="med" len="med"/>
+          </a:ln>
+        </p:spPr>
+        <p:style>
+          <a:lnRef idx="2">
+            <a:schemeClr val="accent1">
+              <a:shade val="15000"/>
+            </a:schemeClr>
+          </a:lnRef>
+          <a:fillRef idx="1">
+            <a:schemeClr val="accent1"/>
+          </a:fillRef>
+          <a:effectRef idx="0">
+            <a:schemeClr val="accent1"/>
+          </a:effectRef>
+          <a:fontRef idx="minor">
+            <a:schemeClr val="lt1"/>
+          </a:fontRef>
+        </p:style>
+        <p:txBody>
+          <a:bodyPr rtlCol="0" anchor="ctr"/>
+          <a:lstStyle/>
+          <a:p>
+            <a:pPr algn="ctr"/>
+            <a:endParaRPr lang="hu-HU"/>
+          </a:p>
+        </p:txBody>
+      </p:sp>
+      <p:sp>
+        <p:nvSpPr>
+          <p:cNvPr id="12" name="Szövegdoboz 11">
+            <a:extLst>
+              <a:ext uri="{FF2B5EF4-FFF2-40B4-BE49-F238E27FC236}">
+                <a16:creationId xmlns:a16="http://schemas.microsoft.com/office/drawing/2014/main" id="{FB4228E9-9D92-147A-09DC-B3110EC77F43}"/>
+              </a:ext>
+            </a:extLst>
+          </p:cNvPr>
+          <p:cNvSpPr txBox="1"/>
+          <p:nvPr/>
+        </p:nvSpPr>
+        <p:spPr>
+          <a:xfrm>
+            <a:off x="9213807" y="2423521"/>
             <a:ext cx="691879" cy="261610"/>
           </a:xfrm>
           <a:prstGeom prst="rect">

</xml_diff>

<commit_message>
Touch Sensing corrected and table button implementes
</commit_message>
<xml_diff>
--- a/Menürendzser.pptx
+++ b/Menürendzser.pptx
@@ -243,7 +243,7 @@
           <a:p>
             <a:fld id="{7520FE40-B5E6-4F63-9BAB-DDB3402A48E9}" type="datetimeFigureOut">
               <a:rPr lang="hu-HU" smtClean="0"/>
-              <a:t>2024. 03. 28.</a:t>
+              <a:t>2024. 03. 30.</a:t>
             </a:fld>
             <a:endParaRPr lang="hu-HU"/>
           </a:p>
@@ -413,7 +413,7 @@
           <a:p>
             <a:fld id="{7520FE40-B5E6-4F63-9BAB-DDB3402A48E9}" type="datetimeFigureOut">
               <a:rPr lang="hu-HU" smtClean="0"/>
-              <a:t>2024. 03. 28.</a:t>
+              <a:t>2024. 03. 30.</a:t>
             </a:fld>
             <a:endParaRPr lang="hu-HU"/>
           </a:p>
@@ -593,7 +593,7 @@
           <a:p>
             <a:fld id="{7520FE40-B5E6-4F63-9BAB-DDB3402A48E9}" type="datetimeFigureOut">
               <a:rPr lang="hu-HU" smtClean="0"/>
-              <a:t>2024. 03. 28.</a:t>
+              <a:t>2024. 03. 30.</a:t>
             </a:fld>
             <a:endParaRPr lang="hu-HU"/>
           </a:p>
@@ -763,7 +763,7 @@
           <a:p>
             <a:fld id="{7520FE40-B5E6-4F63-9BAB-DDB3402A48E9}" type="datetimeFigureOut">
               <a:rPr lang="hu-HU" smtClean="0"/>
-              <a:t>2024. 03. 28.</a:t>
+              <a:t>2024. 03. 30.</a:t>
             </a:fld>
             <a:endParaRPr lang="hu-HU"/>
           </a:p>
@@ -1009,7 +1009,7 @@
           <a:p>
             <a:fld id="{7520FE40-B5E6-4F63-9BAB-DDB3402A48E9}" type="datetimeFigureOut">
               <a:rPr lang="hu-HU" smtClean="0"/>
-              <a:t>2024. 03. 28.</a:t>
+              <a:t>2024. 03. 30.</a:t>
             </a:fld>
             <a:endParaRPr lang="hu-HU"/>
           </a:p>
@@ -1241,7 +1241,7 @@
           <a:p>
             <a:fld id="{7520FE40-B5E6-4F63-9BAB-DDB3402A48E9}" type="datetimeFigureOut">
               <a:rPr lang="hu-HU" smtClean="0"/>
-              <a:t>2024. 03. 28.</a:t>
+              <a:t>2024. 03. 30.</a:t>
             </a:fld>
             <a:endParaRPr lang="hu-HU"/>
           </a:p>
@@ -1608,7 +1608,7 @@
           <a:p>
             <a:fld id="{7520FE40-B5E6-4F63-9BAB-DDB3402A48E9}" type="datetimeFigureOut">
               <a:rPr lang="hu-HU" smtClean="0"/>
-              <a:t>2024. 03. 28.</a:t>
+              <a:t>2024. 03. 30.</a:t>
             </a:fld>
             <a:endParaRPr lang="hu-HU"/>
           </a:p>
@@ -1726,7 +1726,7 @@
           <a:p>
             <a:fld id="{7520FE40-B5E6-4F63-9BAB-DDB3402A48E9}" type="datetimeFigureOut">
               <a:rPr lang="hu-HU" smtClean="0"/>
-              <a:t>2024. 03. 28.</a:t>
+              <a:t>2024. 03. 30.</a:t>
             </a:fld>
             <a:endParaRPr lang="hu-HU"/>
           </a:p>
@@ -1821,7 +1821,7 @@
           <a:p>
             <a:fld id="{7520FE40-B5E6-4F63-9BAB-DDB3402A48E9}" type="datetimeFigureOut">
               <a:rPr lang="hu-HU" smtClean="0"/>
-              <a:t>2024. 03. 28.</a:t>
+              <a:t>2024. 03. 30.</a:t>
             </a:fld>
             <a:endParaRPr lang="hu-HU"/>
           </a:p>
@@ -2098,7 +2098,7 @@
           <a:p>
             <a:fld id="{7520FE40-B5E6-4F63-9BAB-DDB3402A48E9}" type="datetimeFigureOut">
               <a:rPr lang="hu-HU" smtClean="0"/>
-              <a:t>2024. 03. 28.</a:t>
+              <a:t>2024. 03. 30.</a:t>
             </a:fld>
             <a:endParaRPr lang="hu-HU"/>
           </a:p>
@@ -2355,7 +2355,7 @@
           <a:p>
             <a:fld id="{7520FE40-B5E6-4F63-9BAB-DDB3402A48E9}" type="datetimeFigureOut">
               <a:rPr lang="hu-HU" smtClean="0"/>
-              <a:t>2024. 03. 28.</a:t>
+              <a:t>2024. 03. 30.</a:t>
             </a:fld>
             <a:endParaRPr lang="hu-HU"/>
           </a:p>
@@ -2568,7 +2568,7 @@
           <a:p>
             <a:fld id="{7520FE40-B5E6-4F63-9BAB-DDB3402A48E9}" type="datetimeFigureOut">
               <a:rPr lang="hu-HU" smtClean="0"/>
-              <a:t>2024. 03. 28.</a:t>
+              <a:t>2024. 03. 30.</a:t>
             </a:fld>
             <a:endParaRPr lang="hu-HU"/>
           </a:p>
@@ -5534,6 +5534,1037 @@
           </a:p>
         </p:txBody>
       </p:sp>
+      <p:pic>
+        <p:nvPicPr>
+          <p:cNvPr id="2" name="Kép 1">
+            <a:extLst>
+              <a:ext uri="{FF2B5EF4-FFF2-40B4-BE49-F238E27FC236}">
+                <a16:creationId xmlns:a16="http://schemas.microsoft.com/office/drawing/2014/main" id="{2F0FB03B-0442-979B-B9B1-3E5CF615EAA5}"/>
+              </a:ext>
+            </a:extLst>
+          </p:cNvPr>
+          <p:cNvPicPr>
+            <a:picLocks noChangeAspect="1"/>
+          </p:cNvPicPr>
+          <p:nvPr/>
+        </p:nvPicPr>
+        <p:blipFill>
+          <a:blip r:embed="rId13">
+            <a:extLst>
+              <a:ext uri="{28A0092B-C50C-407E-A947-70E740481C1C}">
+                <a14:useLocalDpi xmlns:a14="http://schemas.microsoft.com/office/drawing/2010/main" val="0"/>
+              </a:ext>
+            </a:extLst>
+          </a:blip>
+          <a:srcRect/>
+          <a:stretch/>
+        </p:blipFill>
+        <p:spPr>
+          <a:xfrm>
+            <a:off x="1468889" y="2129180"/>
+            <a:ext cx="2160000" cy="1620000"/>
+          </a:xfrm>
+          <a:prstGeom prst="rect">
+            <a:avLst/>
+          </a:prstGeom>
+        </p:spPr>
+      </p:pic>
+      <p:cxnSp>
+        <p:nvCxnSpPr>
+          <p:cNvPr id="3" name="Egyenes összekötő nyíllal 2">
+            <a:extLst>
+              <a:ext uri="{FF2B5EF4-FFF2-40B4-BE49-F238E27FC236}">
+                <a16:creationId xmlns:a16="http://schemas.microsoft.com/office/drawing/2014/main" id="{6E953714-5A62-BEA7-0D9F-3F3D0CF3824A}"/>
+              </a:ext>
+            </a:extLst>
+          </p:cNvPr>
+          <p:cNvCxnSpPr>
+            <a:cxnSpLocks/>
+            <a:endCxn id="2" idx="3"/>
+          </p:cNvCxnSpPr>
+          <p:nvPr/>
+        </p:nvCxnSpPr>
+        <p:spPr>
+          <a:xfrm flipH="1">
+            <a:off x="3628889" y="2659073"/>
+            <a:ext cx="609618" cy="280107"/>
+          </a:xfrm>
+          <a:prstGeom prst="straightConnector1">
+            <a:avLst/>
+          </a:prstGeom>
+          <a:ln w="76200">
+            <a:solidFill>
+              <a:srgbClr val="00B0F0"/>
+            </a:solidFill>
+            <a:tailEnd type="triangle"/>
+          </a:ln>
+        </p:spPr>
+        <p:style>
+          <a:lnRef idx="3">
+            <a:schemeClr val="dk1"/>
+          </a:lnRef>
+          <a:fillRef idx="0">
+            <a:schemeClr val="dk1"/>
+          </a:fillRef>
+          <a:effectRef idx="2">
+            <a:schemeClr val="dk1"/>
+          </a:effectRef>
+          <a:fontRef idx="minor">
+            <a:schemeClr val="tx1"/>
+          </a:fontRef>
+        </p:style>
+      </p:cxnSp>
+      <p:sp>
+        <p:nvSpPr>
+          <p:cNvPr id="4" name="Szabadkézi sokszög: alakzat 3">
+            <a:extLst>
+              <a:ext uri="{FF2B5EF4-FFF2-40B4-BE49-F238E27FC236}">
+                <a16:creationId xmlns:a16="http://schemas.microsoft.com/office/drawing/2014/main" id="{0B4A105F-3D56-D1F4-B4B4-3899AF46744E}"/>
+              </a:ext>
+            </a:extLst>
+          </p:cNvPr>
+          <p:cNvSpPr/>
+          <p:nvPr/>
+        </p:nvSpPr>
+        <p:spPr>
+          <a:xfrm>
+            <a:off x="4972050" y="3752850"/>
+            <a:ext cx="1828800" cy="441020"/>
+          </a:xfrm>
+          <a:custGeom>
+            <a:avLst/>
+            <a:gdLst>
+              <a:gd name="connsiteX0" fmla="*/ 0 w 1828800"/>
+              <a:gd name="connsiteY0" fmla="*/ 19050 h 441020"/>
+              <a:gd name="connsiteX1" fmla="*/ 266700 w 1828800"/>
+              <a:gd name="connsiteY1" fmla="*/ 428625 h 441020"/>
+              <a:gd name="connsiteX2" fmla="*/ 1266825 w 1828800"/>
+              <a:gd name="connsiteY2" fmla="*/ 304800 h 441020"/>
+              <a:gd name="connsiteX3" fmla="*/ 1828800 w 1828800"/>
+              <a:gd name="connsiteY3" fmla="*/ 0 h 441020"/>
+            </a:gdLst>
+            <a:ahLst/>
+            <a:cxnLst>
+              <a:cxn ang="0">
+                <a:pos x="connsiteX0" y="connsiteY0"/>
+              </a:cxn>
+              <a:cxn ang="0">
+                <a:pos x="connsiteX1" y="connsiteY1"/>
+              </a:cxn>
+              <a:cxn ang="0">
+                <a:pos x="connsiteX2" y="connsiteY2"/>
+              </a:cxn>
+              <a:cxn ang="0">
+                <a:pos x="connsiteX3" y="connsiteY3"/>
+              </a:cxn>
+            </a:cxnLst>
+            <a:rect l="l" t="t" r="r" b="b"/>
+            <a:pathLst>
+              <a:path w="1828800" h="441020">
+                <a:moveTo>
+                  <a:pt x="0" y="19050"/>
+                </a:moveTo>
+                <a:cubicBezTo>
+                  <a:pt x="27781" y="200025"/>
+                  <a:pt x="55563" y="381000"/>
+                  <a:pt x="266700" y="428625"/>
+                </a:cubicBezTo>
+                <a:cubicBezTo>
+                  <a:pt x="477837" y="476250"/>
+                  <a:pt x="1006475" y="376238"/>
+                  <a:pt x="1266825" y="304800"/>
+                </a:cubicBezTo>
+                <a:cubicBezTo>
+                  <a:pt x="1527175" y="233363"/>
+                  <a:pt x="1677987" y="116681"/>
+                  <a:pt x="1828800" y="0"/>
+                </a:cubicBezTo>
+              </a:path>
+            </a:pathLst>
+          </a:custGeom>
+          <a:ln w="38100">
+            <a:solidFill>
+              <a:srgbClr val="FF0000"/>
+            </a:solidFill>
+            <a:headEnd type="none" w="med" len="med"/>
+            <a:tailEnd type="triangle" w="med" len="med"/>
+          </a:ln>
+        </p:spPr>
+        <p:style>
+          <a:lnRef idx="3">
+            <a:schemeClr val="dk1"/>
+          </a:lnRef>
+          <a:fillRef idx="0">
+            <a:schemeClr val="dk1"/>
+          </a:fillRef>
+          <a:effectRef idx="2">
+            <a:schemeClr val="dk1"/>
+          </a:effectRef>
+          <a:fontRef idx="minor">
+            <a:schemeClr val="tx1"/>
+          </a:fontRef>
+        </p:style>
+        <p:txBody>
+          <a:bodyPr rtlCol="0" anchor="ctr"/>
+          <a:lstStyle/>
+          <a:p>
+            <a:pPr algn="ctr"/>
+            <a:endParaRPr lang="hu-HU"/>
+          </a:p>
+        </p:txBody>
+      </p:sp>
+      <p:cxnSp>
+        <p:nvCxnSpPr>
+          <p:cNvPr id="14" name="Egyenes összekötő nyíllal 13">
+            <a:extLst>
+              <a:ext uri="{FF2B5EF4-FFF2-40B4-BE49-F238E27FC236}">
+                <a16:creationId xmlns:a16="http://schemas.microsoft.com/office/drawing/2014/main" id="{129C5ADD-A708-394C-8D41-55096C7780F6}"/>
+              </a:ext>
+            </a:extLst>
+          </p:cNvPr>
+          <p:cNvCxnSpPr>
+            <a:cxnSpLocks/>
+          </p:cNvCxnSpPr>
+          <p:nvPr/>
+        </p:nvCxnSpPr>
+        <p:spPr>
+          <a:xfrm flipV="1">
+            <a:off x="3619145" y="3441700"/>
+            <a:ext cx="553248" cy="34375"/>
+          </a:xfrm>
+          <a:prstGeom prst="straightConnector1">
+            <a:avLst/>
+          </a:prstGeom>
+          <a:ln w="38100">
+            <a:solidFill>
+              <a:srgbClr val="FF0000"/>
+            </a:solidFill>
+            <a:tailEnd type="triangle"/>
+          </a:ln>
+        </p:spPr>
+        <p:style>
+          <a:lnRef idx="3">
+            <a:schemeClr val="dk1"/>
+          </a:lnRef>
+          <a:fillRef idx="0">
+            <a:schemeClr val="dk1"/>
+          </a:fillRef>
+          <a:effectRef idx="2">
+            <a:schemeClr val="dk1"/>
+          </a:effectRef>
+          <a:fontRef idx="minor">
+            <a:schemeClr val="tx1"/>
+          </a:fontRef>
+        </p:style>
+      </p:cxnSp>
+      <p:cxnSp>
+        <p:nvCxnSpPr>
+          <p:cNvPr id="19" name="Egyenes összekötő nyíllal 18">
+            <a:extLst>
+              <a:ext uri="{FF2B5EF4-FFF2-40B4-BE49-F238E27FC236}">
+                <a16:creationId xmlns:a16="http://schemas.microsoft.com/office/drawing/2014/main" id="{54EED7BF-6535-CE42-9D9A-70FC20A2228B}"/>
+              </a:ext>
+            </a:extLst>
+          </p:cNvPr>
+          <p:cNvCxnSpPr>
+            <a:cxnSpLocks/>
+            <a:endCxn id="23" idx="3"/>
+          </p:cNvCxnSpPr>
+          <p:nvPr/>
+        </p:nvCxnSpPr>
+        <p:spPr>
+          <a:xfrm flipV="1">
+            <a:off x="3571078" y="2536533"/>
+            <a:ext cx="641486" cy="50330"/>
+          </a:xfrm>
+          <a:prstGeom prst="straightConnector1">
+            <a:avLst/>
+          </a:prstGeom>
+          <a:ln w="38100">
+            <a:solidFill>
+              <a:srgbClr val="00FF00"/>
+            </a:solidFill>
+            <a:tailEnd type="triangle"/>
+          </a:ln>
+        </p:spPr>
+        <p:style>
+          <a:lnRef idx="3">
+            <a:schemeClr val="dk1"/>
+          </a:lnRef>
+          <a:fillRef idx="0">
+            <a:schemeClr val="dk1"/>
+          </a:fillRef>
+          <a:effectRef idx="2">
+            <a:schemeClr val="dk1"/>
+          </a:effectRef>
+          <a:fontRef idx="minor">
+            <a:schemeClr val="tx1"/>
+          </a:fontRef>
+        </p:style>
+      </p:cxnSp>
+      <p:sp>
+        <p:nvSpPr>
+          <p:cNvPr id="23" name="Szövegdoboz 22">
+            <a:extLst>
+              <a:ext uri="{FF2B5EF4-FFF2-40B4-BE49-F238E27FC236}">
+                <a16:creationId xmlns:a16="http://schemas.microsoft.com/office/drawing/2014/main" id="{6865C67F-DB85-8471-A503-31A9D260442E}"/>
+              </a:ext>
+            </a:extLst>
+          </p:cNvPr>
+          <p:cNvSpPr txBox="1"/>
+          <p:nvPr/>
+        </p:nvSpPr>
+        <p:spPr>
+          <a:xfrm>
+            <a:off x="3520685" y="2405728"/>
+            <a:ext cx="691879" cy="261610"/>
+          </a:xfrm>
+          <a:prstGeom prst="rect">
+            <a:avLst/>
+          </a:prstGeom>
+          <a:noFill/>
+        </p:spPr>
+        <p:txBody>
+          <a:bodyPr wrap="square" rtlCol="0">
+            <a:spAutoFit/>
+          </a:bodyPr>
+          <a:lstStyle/>
+          <a:p>
+            <a:pPr algn="ctr"/>
+            <a:r>
+              <a:rPr lang="hu-HU" sz="1100" dirty="0"/>
+              <a:t>Mentés</a:t>
+            </a:r>
+          </a:p>
+        </p:txBody>
+      </p:sp>
+      <p:sp>
+        <p:nvSpPr>
+          <p:cNvPr id="26" name="Szövegdoboz 25">
+            <a:extLst>
+              <a:ext uri="{FF2B5EF4-FFF2-40B4-BE49-F238E27FC236}">
+                <a16:creationId xmlns:a16="http://schemas.microsoft.com/office/drawing/2014/main" id="{C83C5094-04D8-9AF8-645D-C79469CFD336}"/>
+              </a:ext>
+            </a:extLst>
+          </p:cNvPr>
+          <p:cNvSpPr txBox="1"/>
+          <p:nvPr/>
+        </p:nvSpPr>
+        <p:spPr>
+          <a:xfrm>
+            <a:off x="3553460" y="3404645"/>
+            <a:ext cx="691879" cy="261610"/>
+          </a:xfrm>
+          <a:prstGeom prst="rect">
+            <a:avLst/>
+          </a:prstGeom>
+          <a:noFill/>
+        </p:spPr>
+        <p:txBody>
+          <a:bodyPr wrap="square" rtlCol="0">
+            <a:spAutoFit/>
+          </a:bodyPr>
+          <a:lstStyle/>
+          <a:p>
+            <a:pPr algn="ctr"/>
+            <a:r>
+              <a:rPr lang="hu-HU" sz="1100" dirty="0"/>
+              <a:t>Vissza</a:t>
+            </a:r>
+          </a:p>
+        </p:txBody>
+      </p:sp>
+      <p:sp>
+        <p:nvSpPr>
+          <p:cNvPr id="29" name="Szövegdoboz 28">
+            <a:extLst>
+              <a:ext uri="{FF2B5EF4-FFF2-40B4-BE49-F238E27FC236}">
+                <a16:creationId xmlns:a16="http://schemas.microsoft.com/office/drawing/2014/main" id="{8CE9370F-16C5-D47D-810F-61C1D826B425}"/>
+              </a:ext>
+            </a:extLst>
+          </p:cNvPr>
+          <p:cNvSpPr txBox="1"/>
+          <p:nvPr/>
+        </p:nvSpPr>
+        <p:spPr>
+          <a:xfrm>
+            <a:off x="5005503" y="3969084"/>
+            <a:ext cx="691879" cy="261610"/>
+          </a:xfrm>
+          <a:prstGeom prst="rect">
+            <a:avLst/>
+          </a:prstGeom>
+          <a:noFill/>
+        </p:spPr>
+        <p:txBody>
+          <a:bodyPr wrap="square" rtlCol="0">
+            <a:spAutoFit/>
+          </a:bodyPr>
+          <a:lstStyle/>
+          <a:p>
+            <a:pPr algn="ctr"/>
+            <a:r>
+              <a:rPr lang="hu-HU" sz="1100" dirty="0"/>
+              <a:t>Vissza</a:t>
+            </a:r>
+          </a:p>
+        </p:txBody>
+      </p:sp>
+      <p:sp>
+        <p:nvSpPr>
+          <p:cNvPr id="30" name="Szabadkézi sokszög: alakzat 29">
+            <a:extLst>
+              <a:ext uri="{FF2B5EF4-FFF2-40B4-BE49-F238E27FC236}">
+                <a16:creationId xmlns:a16="http://schemas.microsoft.com/office/drawing/2014/main" id="{226E10D1-2C53-9DCD-01A6-4B854BC8A033}"/>
+              </a:ext>
+            </a:extLst>
+          </p:cNvPr>
+          <p:cNvSpPr/>
+          <p:nvPr/>
+        </p:nvSpPr>
+        <p:spPr>
+          <a:xfrm>
+            <a:off x="6210300" y="1885880"/>
+            <a:ext cx="3340100" cy="501720"/>
+          </a:xfrm>
+          <a:custGeom>
+            <a:avLst/>
+            <a:gdLst>
+              <a:gd name="connsiteX0" fmla="*/ 0 w 3340100"/>
+              <a:gd name="connsiteY0" fmla="*/ 235020 h 501720"/>
+              <a:gd name="connsiteX1" fmla="*/ 495300 w 3340100"/>
+              <a:gd name="connsiteY1" fmla="*/ 63570 h 501720"/>
+              <a:gd name="connsiteX2" fmla="*/ 2355850 w 3340100"/>
+              <a:gd name="connsiteY2" fmla="*/ 31820 h 501720"/>
+              <a:gd name="connsiteX3" fmla="*/ 3340100 w 3340100"/>
+              <a:gd name="connsiteY3" fmla="*/ 501720 h 501720"/>
+            </a:gdLst>
+            <a:ahLst/>
+            <a:cxnLst>
+              <a:cxn ang="0">
+                <a:pos x="connsiteX0" y="connsiteY0"/>
+              </a:cxn>
+              <a:cxn ang="0">
+                <a:pos x="connsiteX1" y="connsiteY1"/>
+              </a:cxn>
+              <a:cxn ang="0">
+                <a:pos x="connsiteX2" y="connsiteY2"/>
+              </a:cxn>
+              <a:cxn ang="0">
+                <a:pos x="connsiteX3" y="connsiteY3"/>
+              </a:cxn>
+            </a:cxnLst>
+            <a:rect l="l" t="t" r="r" b="b"/>
+            <a:pathLst>
+              <a:path w="3340100" h="501720">
+                <a:moveTo>
+                  <a:pt x="0" y="235020"/>
+                </a:moveTo>
+                <a:cubicBezTo>
+                  <a:pt x="51329" y="166228"/>
+                  <a:pt x="102658" y="97437"/>
+                  <a:pt x="495300" y="63570"/>
+                </a:cubicBezTo>
+                <a:cubicBezTo>
+                  <a:pt x="887942" y="29703"/>
+                  <a:pt x="1881717" y="-41205"/>
+                  <a:pt x="2355850" y="31820"/>
+                </a:cubicBezTo>
+                <a:cubicBezTo>
+                  <a:pt x="2829983" y="104845"/>
+                  <a:pt x="3085041" y="303282"/>
+                  <a:pt x="3340100" y="501720"/>
+                </a:cubicBezTo>
+              </a:path>
+            </a:pathLst>
+          </a:custGeom>
+          <a:noFill/>
+          <a:ln w="76200">
+            <a:solidFill>
+              <a:srgbClr val="52E1E8"/>
+            </a:solidFill>
+          </a:ln>
+        </p:spPr>
+        <p:style>
+          <a:lnRef idx="2">
+            <a:schemeClr val="accent1">
+              <a:shade val="15000"/>
+            </a:schemeClr>
+          </a:lnRef>
+          <a:fillRef idx="1">
+            <a:schemeClr val="accent1"/>
+          </a:fillRef>
+          <a:effectRef idx="0">
+            <a:schemeClr val="accent1"/>
+          </a:effectRef>
+          <a:fontRef idx="minor">
+            <a:schemeClr val="lt1"/>
+          </a:fontRef>
+        </p:style>
+        <p:txBody>
+          <a:bodyPr rtlCol="0" anchor="ctr"/>
+          <a:lstStyle/>
+          <a:p>
+            <a:pPr algn="ctr"/>
+            <a:endParaRPr lang="hu-HU"/>
+          </a:p>
+        </p:txBody>
+      </p:sp>
+      <p:sp>
+        <p:nvSpPr>
+          <p:cNvPr id="34" name="Szabadkézi sokszög: alakzat 33">
+            <a:extLst>
+              <a:ext uri="{FF2B5EF4-FFF2-40B4-BE49-F238E27FC236}">
+                <a16:creationId xmlns:a16="http://schemas.microsoft.com/office/drawing/2014/main" id="{DC083A6D-9679-9BC7-FCF2-D092BB242840}"/>
+              </a:ext>
+            </a:extLst>
+          </p:cNvPr>
+          <p:cNvSpPr/>
+          <p:nvPr/>
+        </p:nvSpPr>
+        <p:spPr>
+          <a:xfrm>
+            <a:off x="3479800" y="1880631"/>
+            <a:ext cx="4167438" cy="268347"/>
+          </a:xfrm>
+          <a:custGeom>
+            <a:avLst/>
+            <a:gdLst>
+              <a:gd name="connsiteX0" fmla="*/ 0 w 3771900"/>
+              <a:gd name="connsiteY0" fmla="*/ 240268 h 240268"/>
+              <a:gd name="connsiteX1" fmla="*/ 1181100 w 3771900"/>
+              <a:gd name="connsiteY1" fmla="*/ 30718 h 240268"/>
+              <a:gd name="connsiteX2" fmla="*/ 3771900 w 3771900"/>
+              <a:gd name="connsiteY2" fmla="*/ 5318 h 240268"/>
+            </a:gdLst>
+            <a:ahLst/>
+            <a:cxnLst>
+              <a:cxn ang="0">
+                <a:pos x="connsiteX0" y="connsiteY0"/>
+              </a:cxn>
+              <a:cxn ang="0">
+                <a:pos x="connsiteX1" y="connsiteY1"/>
+              </a:cxn>
+              <a:cxn ang="0">
+                <a:pos x="connsiteX2" y="connsiteY2"/>
+              </a:cxn>
+            </a:cxnLst>
+            <a:rect l="l" t="t" r="r" b="b"/>
+            <a:pathLst>
+              <a:path w="3771900" h="240268">
+                <a:moveTo>
+                  <a:pt x="0" y="240268"/>
+                </a:moveTo>
+                <a:cubicBezTo>
+                  <a:pt x="276225" y="155072"/>
+                  <a:pt x="552450" y="69876"/>
+                  <a:pt x="1181100" y="30718"/>
+                </a:cubicBezTo>
+                <a:cubicBezTo>
+                  <a:pt x="1809750" y="-8440"/>
+                  <a:pt x="2790825" y="-1561"/>
+                  <a:pt x="3771900" y="5318"/>
+                </a:cubicBezTo>
+              </a:path>
+            </a:pathLst>
+          </a:custGeom>
+          <a:noFill/>
+          <a:ln w="76200">
+            <a:solidFill>
+              <a:srgbClr val="52E1E8"/>
+            </a:solidFill>
+          </a:ln>
+        </p:spPr>
+        <p:style>
+          <a:lnRef idx="2">
+            <a:schemeClr val="accent1">
+              <a:shade val="15000"/>
+            </a:schemeClr>
+          </a:lnRef>
+          <a:fillRef idx="1">
+            <a:schemeClr val="accent1"/>
+          </a:fillRef>
+          <a:effectRef idx="0">
+            <a:schemeClr val="accent1"/>
+          </a:effectRef>
+          <a:fontRef idx="minor">
+            <a:schemeClr val="lt1"/>
+          </a:fontRef>
+        </p:style>
+        <p:txBody>
+          <a:bodyPr rtlCol="0" anchor="ctr"/>
+          <a:lstStyle/>
+          <a:p>
+            <a:pPr algn="ctr"/>
+            <a:endParaRPr lang="hu-HU"/>
+          </a:p>
+        </p:txBody>
+      </p:sp>
+      <p:pic>
+        <p:nvPicPr>
+          <p:cNvPr id="35" name="Kép 34">
+            <a:extLst>
+              <a:ext uri="{FF2B5EF4-FFF2-40B4-BE49-F238E27FC236}">
+                <a16:creationId xmlns:a16="http://schemas.microsoft.com/office/drawing/2014/main" id="{B31F607A-DD58-018B-C77A-135AAF38E1AD}"/>
+              </a:ext>
+            </a:extLst>
+          </p:cNvPr>
+          <p:cNvPicPr>
+            <a:picLocks noChangeAspect="1"/>
+          </p:cNvPicPr>
+          <p:nvPr/>
+        </p:nvPicPr>
+        <p:blipFill>
+          <a:blip r:embed="rId14">
+            <a:extLst>
+              <a:ext uri="{28A0092B-C50C-407E-A947-70E740481C1C}">
+                <a14:useLocalDpi xmlns:a14="http://schemas.microsoft.com/office/drawing/2010/main" val="0"/>
+              </a:ext>
+            </a:extLst>
+          </a:blip>
+          <a:srcRect/>
+          <a:stretch/>
+        </p:blipFill>
+        <p:spPr>
+          <a:xfrm>
+            <a:off x="6865828" y="6729827"/>
+            <a:ext cx="2160000" cy="1620000"/>
+          </a:xfrm>
+          <a:prstGeom prst="rect">
+            <a:avLst/>
+          </a:prstGeom>
+        </p:spPr>
+      </p:pic>
+      <p:cxnSp>
+        <p:nvCxnSpPr>
+          <p:cNvPr id="36" name="Egyenes összekötő nyíllal 35">
+            <a:extLst>
+              <a:ext uri="{FF2B5EF4-FFF2-40B4-BE49-F238E27FC236}">
+                <a16:creationId xmlns:a16="http://schemas.microsoft.com/office/drawing/2014/main" id="{A62F2034-CB62-7B93-8B9B-8E0D8EA13128}"/>
+              </a:ext>
+            </a:extLst>
+          </p:cNvPr>
+          <p:cNvCxnSpPr>
+            <a:cxnSpLocks/>
+            <a:endCxn id="35" idx="3"/>
+          </p:cNvCxnSpPr>
+          <p:nvPr/>
+        </p:nvCxnSpPr>
+        <p:spPr>
+          <a:xfrm flipH="1">
+            <a:off x="9025828" y="6217920"/>
+            <a:ext cx="635103" cy="1321907"/>
+          </a:xfrm>
+          <a:prstGeom prst="straightConnector1">
+            <a:avLst/>
+          </a:prstGeom>
+          <a:ln w="76200">
+            <a:solidFill>
+              <a:srgbClr val="00B0F0"/>
+            </a:solidFill>
+            <a:tailEnd type="triangle"/>
+          </a:ln>
+        </p:spPr>
+        <p:style>
+          <a:lnRef idx="3">
+            <a:schemeClr val="dk1"/>
+          </a:lnRef>
+          <a:fillRef idx="0">
+            <a:schemeClr val="dk1"/>
+          </a:fillRef>
+          <a:effectRef idx="2">
+            <a:schemeClr val="dk1"/>
+          </a:effectRef>
+          <a:fontRef idx="minor">
+            <a:schemeClr val="tx1"/>
+          </a:fontRef>
+        </p:style>
+      </p:cxnSp>
+      <p:sp>
+        <p:nvSpPr>
+          <p:cNvPr id="39" name="Szabadkézi sokszög: alakzat 38">
+            <a:extLst>
+              <a:ext uri="{FF2B5EF4-FFF2-40B4-BE49-F238E27FC236}">
+                <a16:creationId xmlns:a16="http://schemas.microsoft.com/office/drawing/2014/main" id="{1D9B80F9-08EE-9C97-E120-EFA2AC8B685F}"/>
+              </a:ext>
+            </a:extLst>
+          </p:cNvPr>
+          <p:cNvSpPr/>
+          <p:nvPr/>
+        </p:nvSpPr>
+        <p:spPr>
+          <a:xfrm>
+            <a:off x="8968740" y="6608366"/>
+            <a:ext cx="1102227" cy="577604"/>
+          </a:xfrm>
+          <a:custGeom>
+            <a:avLst/>
+            <a:gdLst>
+              <a:gd name="connsiteX0" fmla="*/ 0 w 1135380"/>
+              <a:gd name="connsiteY0" fmla="*/ 518160 h 556569"/>
+              <a:gd name="connsiteX1" fmla="*/ 662940 w 1135380"/>
+              <a:gd name="connsiteY1" fmla="*/ 502920 h 556569"/>
+              <a:gd name="connsiteX2" fmla="*/ 1135380 w 1135380"/>
+              <a:gd name="connsiteY2" fmla="*/ 0 h 556569"/>
+            </a:gdLst>
+            <a:ahLst/>
+            <a:cxnLst>
+              <a:cxn ang="0">
+                <a:pos x="connsiteX0" y="connsiteY0"/>
+              </a:cxn>
+              <a:cxn ang="0">
+                <a:pos x="connsiteX1" y="connsiteY1"/>
+              </a:cxn>
+              <a:cxn ang="0">
+                <a:pos x="connsiteX2" y="connsiteY2"/>
+              </a:cxn>
+            </a:cxnLst>
+            <a:rect l="l" t="t" r="r" b="b"/>
+            <a:pathLst>
+              <a:path w="1135380" h="556569">
+                <a:moveTo>
+                  <a:pt x="0" y="518160"/>
+                </a:moveTo>
+                <a:cubicBezTo>
+                  <a:pt x="236855" y="553720"/>
+                  <a:pt x="473710" y="589280"/>
+                  <a:pt x="662940" y="502920"/>
+                </a:cubicBezTo>
+                <a:cubicBezTo>
+                  <a:pt x="852170" y="416560"/>
+                  <a:pt x="993775" y="208280"/>
+                  <a:pt x="1135380" y="0"/>
+                </a:cubicBezTo>
+              </a:path>
+            </a:pathLst>
+          </a:custGeom>
+          <a:noFill/>
+          <a:ln w="38100">
+            <a:solidFill>
+              <a:srgbClr val="00FF00"/>
+            </a:solidFill>
+            <a:headEnd type="none" w="med" len="med"/>
+            <a:tailEnd type="triangle" w="med" len="med"/>
+          </a:ln>
+        </p:spPr>
+        <p:style>
+          <a:lnRef idx="2">
+            <a:schemeClr val="accent1">
+              <a:shade val="15000"/>
+            </a:schemeClr>
+          </a:lnRef>
+          <a:fillRef idx="1">
+            <a:schemeClr val="accent1"/>
+          </a:fillRef>
+          <a:effectRef idx="0">
+            <a:schemeClr val="accent1"/>
+          </a:effectRef>
+          <a:fontRef idx="minor">
+            <a:schemeClr val="lt1"/>
+          </a:fontRef>
+        </p:style>
+        <p:txBody>
+          <a:bodyPr rtlCol="0" anchor="ctr"/>
+          <a:lstStyle/>
+          <a:p>
+            <a:pPr algn="ctr"/>
+            <a:endParaRPr lang="hu-HU"/>
+          </a:p>
+        </p:txBody>
+      </p:sp>
+      <p:sp>
+        <p:nvSpPr>
+          <p:cNvPr id="42" name="Szabadkézi sokszög: alakzat 41">
+            <a:extLst>
+              <a:ext uri="{FF2B5EF4-FFF2-40B4-BE49-F238E27FC236}">
+                <a16:creationId xmlns:a16="http://schemas.microsoft.com/office/drawing/2014/main" id="{D19EDB4A-28B2-4ED9-FAD0-B2CBEE1B43B5}"/>
+              </a:ext>
+            </a:extLst>
+          </p:cNvPr>
+          <p:cNvSpPr/>
+          <p:nvPr/>
+        </p:nvSpPr>
+        <p:spPr>
+          <a:xfrm>
+            <a:off x="8884920" y="6263640"/>
+            <a:ext cx="304800" cy="487632"/>
+          </a:xfrm>
+          <a:custGeom>
+            <a:avLst/>
+            <a:gdLst>
+              <a:gd name="connsiteX0" fmla="*/ 0 w 304800"/>
+              <a:gd name="connsiteY0" fmla="*/ 457200 h 457200"/>
+              <a:gd name="connsiteX1" fmla="*/ 76200 w 304800"/>
+              <a:gd name="connsiteY1" fmla="*/ 167640 h 457200"/>
+              <a:gd name="connsiteX2" fmla="*/ 304800 w 304800"/>
+              <a:gd name="connsiteY2" fmla="*/ 0 h 457200"/>
+            </a:gdLst>
+            <a:ahLst/>
+            <a:cxnLst>
+              <a:cxn ang="0">
+                <a:pos x="connsiteX0" y="connsiteY0"/>
+              </a:cxn>
+              <a:cxn ang="0">
+                <a:pos x="connsiteX1" y="connsiteY1"/>
+              </a:cxn>
+              <a:cxn ang="0">
+                <a:pos x="connsiteX2" y="connsiteY2"/>
+              </a:cxn>
+            </a:cxnLst>
+            <a:rect l="l" t="t" r="r" b="b"/>
+            <a:pathLst>
+              <a:path w="304800" h="457200">
+                <a:moveTo>
+                  <a:pt x="0" y="457200"/>
+                </a:moveTo>
+                <a:cubicBezTo>
+                  <a:pt x="12700" y="350520"/>
+                  <a:pt x="25400" y="243840"/>
+                  <a:pt x="76200" y="167640"/>
+                </a:cubicBezTo>
+                <a:cubicBezTo>
+                  <a:pt x="127000" y="91440"/>
+                  <a:pt x="215900" y="45720"/>
+                  <a:pt x="304800" y="0"/>
+                </a:cubicBezTo>
+              </a:path>
+            </a:pathLst>
+          </a:custGeom>
+          <a:noFill/>
+          <a:ln w="76200">
+            <a:solidFill>
+              <a:srgbClr val="52E1E8"/>
+            </a:solidFill>
+            <a:headEnd type="none" w="med" len="med"/>
+            <a:tailEnd type="triangle" w="med" len="med"/>
+          </a:ln>
+        </p:spPr>
+        <p:style>
+          <a:lnRef idx="2">
+            <a:schemeClr val="accent1">
+              <a:shade val="15000"/>
+            </a:schemeClr>
+          </a:lnRef>
+          <a:fillRef idx="1">
+            <a:schemeClr val="accent1"/>
+          </a:fillRef>
+          <a:effectRef idx="0">
+            <a:schemeClr val="accent1"/>
+          </a:effectRef>
+          <a:fontRef idx="minor">
+            <a:schemeClr val="lt1"/>
+          </a:fontRef>
+        </p:style>
+        <p:txBody>
+          <a:bodyPr rtlCol="0" anchor="ctr"/>
+          <a:lstStyle/>
+          <a:p>
+            <a:pPr algn="ctr"/>
+            <a:endParaRPr lang="hu-HU"/>
+          </a:p>
+        </p:txBody>
+      </p:sp>
+      <p:sp>
+        <p:nvSpPr>
+          <p:cNvPr id="43" name="Szabadkézi sokszög: alakzat 42">
+            <a:extLst>
+              <a:ext uri="{FF2B5EF4-FFF2-40B4-BE49-F238E27FC236}">
+                <a16:creationId xmlns:a16="http://schemas.microsoft.com/office/drawing/2014/main" id="{AE88D5CC-2C26-5631-96E9-B9E3B82B15C2}"/>
+              </a:ext>
+            </a:extLst>
+          </p:cNvPr>
+          <p:cNvSpPr/>
+          <p:nvPr/>
+        </p:nvSpPr>
+        <p:spPr>
+          <a:xfrm>
+            <a:off x="8953500" y="6621780"/>
+            <a:ext cx="723900" cy="1508760"/>
+          </a:xfrm>
+          <a:custGeom>
+            <a:avLst/>
+            <a:gdLst>
+              <a:gd name="connsiteX0" fmla="*/ 0 w 723900"/>
+              <a:gd name="connsiteY0" fmla="*/ 1508760 h 1508760"/>
+              <a:gd name="connsiteX1" fmla="*/ 495300 w 723900"/>
+              <a:gd name="connsiteY1" fmla="*/ 1051560 h 1508760"/>
+              <a:gd name="connsiteX2" fmla="*/ 723900 w 723900"/>
+              <a:gd name="connsiteY2" fmla="*/ 0 h 1508760"/>
+            </a:gdLst>
+            <a:ahLst/>
+            <a:cxnLst>
+              <a:cxn ang="0">
+                <a:pos x="connsiteX0" y="connsiteY0"/>
+              </a:cxn>
+              <a:cxn ang="0">
+                <a:pos x="connsiteX1" y="connsiteY1"/>
+              </a:cxn>
+              <a:cxn ang="0">
+                <a:pos x="connsiteX2" y="connsiteY2"/>
+              </a:cxn>
+            </a:cxnLst>
+            <a:rect l="l" t="t" r="r" b="b"/>
+            <a:pathLst>
+              <a:path w="723900" h="1508760">
+                <a:moveTo>
+                  <a:pt x="0" y="1508760"/>
+                </a:moveTo>
+                <a:cubicBezTo>
+                  <a:pt x="187325" y="1405890"/>
+                  <a:pt x="374650" y="1303020"/>
+                  <a:pt x="495300" y="1051560"/>
+                </a:cubicBezTo>
+                <a:cubicBezTo>
+                  <a:pt x="615950" y="800100"/>
+                  <a:pt x="669925" y="400050"/>
+                  <a:pt x="723900" y="0"/>
+                </a:cubicBezTo>
+              </a:path>
+            </a:pathLst>
+          </a:custGeom>
+          <a:ln w="38100">
+            <a:solidFill>
+              <a:srgbClr val="FF0000"/>
+            </a:solidFill>
+            <a:headEnd type="none" w="med" len="med"/>
+            <a:tailEnd type="triangle" w="med" len="med"/>
+          </a:ln>
+        </p:spPr>
+        <p:style>
+          <a:lnRef idx="3">
+            <a:schemeClr val="dk1"/>
+          </a:lnRef>
+          <a:fillRef idx="0">
+            <a:schemeClr val="dk1"/>
+          </a:fillRef>
+          <a:effectRef idx="2">
+            <a:schemeClr val="dk1"/>
+          </a:effectRef>
+          <a:fontRef idx="minor">
+            <a:schemeClr val="tx1"/>
+          </a:fontRef>
+        </p:style>
+        <p:txBody>
+          <a:bodyPr rtlCol="0" anchor="ctr"/>
+          <a:lstStyle/>
+          <a:p>
+            <a:pPr algn="ctr"/>
+            <a:endParaRPr lang="hu-HU">
+              <a:solidFill>
+                <a:schemeClr val="tx1"/>
+              </a:solidFill>
+            </a:endParaRPr>
+          </a:p>
+        </p:txBody>
+      </p:sp>
+      <p:sp>
+        <p:nvSpPr>
+          <p:cNvPr id="44" name="Szövegdoboz 43">
+            <a:extLst>
+              <a:ext uri="{FF2B5EF4-FFF2-40B4-BE49-F238E27FC236}">
+                <a16:creationId xmlns:a16="http://schemas.microsoft.com/office/drawing/2014/main" id="{3F829947-D576-D921-8BD3-87E7F997DCBF}"/>
+              </a:ext>
+            </a:extLst>
+          </p:cNvPr>
+          <p:cNvSpPr txBox="1"/>
+          <p:nvPr/>
+        </p:nvSpPr>
+        <p:spPr>
+          <a:xfrm>
+            <a:off x="9663995" y="6698764"/>
+            <a:ext cx="691879" cy="261610"/>
+          </a:xfrm>
+          <a:prstGeom prst="rect">
+            <a:avLst/>
+          </a:prstGeom>
+          <a:noFill/>
+        </p:spPr>
+        <p:txBody>
+          <a:bodyPr wrap="square" rtlCol="0">
+            <a:spAutoFit/>
+          </a:bodyPr>
+          <a:lstStyle/>
+          <a:p>
+            <a:pPr algn="ctr"/>
+            <a:r>
+              <a:rPr lang="hu-HU" sz="1100" dirty="0"/>
+              <a:t>Mentés</a:t>
+            </a:r>
+          </a:p>
+        </p:txBody>
+      </p:sp>
+      <p:sp>
+        <p:nvSpPr>
+          <p:cNvPr id="46" name="Szövegdoboz 45">
+            <a:extLst>
+              <a:ext uri="{FF2B5EF4-FFF2-40B4-BE49-F238E27FC236}">
+                <a16:creationId xmlns:a16="http://schemas.microsoft.com/office/drawing/2014/main" id="{E8A77FC8-BB1F-6168-4DF3-14F634DC4352}"/>
+              </a:ext>
+            </a:extLst>
+          </p:cNvPr>
+          <p:cNvSpPr txBox="1"/>
+          <p:nvPr/>
+        </p:nvSpPr>
+        <p:spPr>
+          <a:xfrm>
+            <a:off x="9049838" y="7875595"/>
+            <a:ext cx="691879" cy="261610"/>
+          </a:xfrm>
+          <a:prstGeom prst="rect">
+            <a:avLst/>
+          </a:prstGeom>
+          <a:noFill/>
+        </p:spPr>
+        <p:txBody>
+          <a:bodyPr wrap="square" rtlCol="0">
+            <a:spAutoFit/>
+          </a:bodyPr>
+          <a:lstStyle/>
+          <a:p>
+            <a:pPr algn="ctr"/>
+            <a:r>
+              <a:rPr lang="hu-HU" sz="1100" dirty="0"/>
+              <a:t>Vissza</a:t>
+            </a:r>
+          </a:p>
+        </p:txBody>
+      </p:sp>
+      <p:sp>
+        <p:nvSpPr>
+          <p:cNvPr id="47" name="Szövegdoboz 46">
+            <a:extLst>
+              <a:ext uri="{FF2B5EF4-FFF2-40B4-BE49-F238E27FC236}">
+                <a16:creationId xmlns:a16="http://schemas.microsoft.com/office/drawing/2014/main" id="{D6921415-3D5F-0144-D051-5FBA73FF7C59}"/>
+              </a:ext>
+            </a:extLst>
+          </p:cNvPr>
+          <p:cNvSpPr txBox="1"/>
+          <p:nvPr/>
+        </p:nvSpPr>
+        <p:spPr>
+          <a:xfrm>
+            <a:off x="8527957" y="6416917"/>
+            <a:ext cx="691879" cy="261610"/>
+          </a:xfrm>
+          <a:prstGeom prst="rect">
+            <a:avLst/>
+          </a:prstGeom>
+          <a:noFill/>
+        </p:spPr>
+        <p:txBody>
+          <a:bodyPr wrap="square" rtlCol="0">
+            <a:spAutoFit/>
+          </a:bodyPr>
+          <a:lstStyle/>
+          <a:p>
+            <a:pPr algn="ctr"/>
+            <a:r>
+              <a:rPr lang="hu-HU" sz="1100" dirty="0"/>
+              <a:t>Vissza</a:t>
+            </a:r>
+          </a:p>
+        </p:txBody>
+      </p:sp>
     </p:spTree>
     <p:extLst>
       <p:ext uri="{BB962C8B-B14F-4D97-AF65-F5344CB8AC3E}">

</xml_diff>

<commit_message>
Period submenu progress and Period type declared
</commit_message>
<xml_diff>
--- a/Menürendzser.pptx
+++ b/Menürendzser.pptx
@@ -243,7 +243,7 @@
           <a:p>
             <a:fld id="{7520FE40-B5E6-4F63-9BAB-DDB3402A48E9}" type="datetimeFigureOut">
               <a:rPr lang="hu-HU" smtClean="0"/>
-              <a:t>2024. 03. 30.</a:t>
+              <a:t>2024. 03. 31.</a:t>
             </a:fld>
             <a:endParaRPr lang="hu-HU"/>
           </a:p>
@@ -413,7 +413,7 @@
           <a:p>
             <a:fld id="{7520FE40-B5E6-4F63-9BAB-DDB3402A48E9}" type="datetimeFigureOut">
               <a:rPr lang="hu-HU" smtClean="0"/>
-              <a:t>2024. 03. 30.</a:t>
+              <a:t>2024. 03. 31.</a:t>
             </a:fld>
             <a:endParaRPr lang="hu-HU"/>
           </a:p>
@@ -593,7 +593,7 @@
           <a:p>
             <a:fld id="{7520FE40-B5E6-4F63-9BAB-DDB3402A48E9}" type="datetimeFigureOut">
               <a:rPr lang="hu-HU" smtClean="0"/>
-              <a:t>2024. 03. 30.</a:t>
+              <a:t>2024. 03. 31.</a:t>
             </a:fld>
             <a:endParaRPr lang="hu-HU"/>
           </a:p>
@@ -763,7 +763,7 @@
           <a:p>
             <a:fld id="{7520FE40-B5E6-4F63-9BAB-DDB3402A48E9}" type="datetimeFigureOut">
               <a:rPr lang="hu-HU" smtClean="0"/>
-              <a:t>2024. 03. 30.</a:t>
+              <a:t>2024. 03. 31.</a:t>
             </a:fld>
             <a:endParaRPr lang="hu-HU"/>
           </a:p>
@@ -1009,7 +1009,7 @@
           <a:p>
             <a:fld id="{7520FE40-B5E6-4F63-9BAB-DDB3402A48E9}" type="datetimeFigureOut">
               <a:rPr lang="hu-HU" smtClean="0"/>
-              <a:t>2024. 03. 30.</a:t>
+              <a:t>2024. 03. 31.</a:t>
             </a:fld>
             <a:endParaRPr lang="hu-HU"/>
           </a:p>
@@ -1241,7 +1241,7 @@
           <a:p>
             <a:fld id="{7520FE40-B5E6-4F63-9BAB-DDB3402A48E9}" type="datetimeFigureOut">
               <a:rPr lang="hu-HU" smtClean="0"/>
-              <a:t>2024. 03. 30.</a:t>
+              <a:t>2024. 03. 31.</a:t>
             </a:fld>
             <a:endParaRPr lang="hu-HU"/>
           </a:p>
@@ -1608,7 +1608,7 @@
           <a:p>
             <a:fld id="{7520FE40-B5E6-4F63-9BAB-DDB3402A48E9}" type="datetimeFigureOut">
               <a:rPr lang="hu-HU" smtClean="0"/>
-              <a:t>2024. 03. 30.</a:t>
+              <a:t>2024. 03. 31.</a:t>
             </a:fld>
             <a:endParaRPr lang="hu-HU"/>
           </a:p>
@@ -1726,7 +1726,7 @@
           <a:p>
             <a:fld id="{7520FE40-B5E6-4F63-9BAB-DDB3402A48E9}" type="datetimeFigureOut">
               <a:rPr lang="hu-HU" smtClean="0"/>
-              <a:t>2024. 03. 30.</a:t>
+              <a:t>2024. 03. 31.</a:t>
             </a:fld>
             <a:endParaRPr lang="hu-HU"/>
           </a:p>
@@ -1821,7 +1821,7 @@
           <a:p>
             <a:fld id="{7520FE40-B5E6-4F63-9BAB-DDB3402A48E9}" type="datetimeFigureOut">
               <a:rPr lang="hu-HU" smtClean="0"/>
-              <a:t>2024. 03. 30.</a:t>
+              <a:t>2024. 03. 31.</a:t>
             </a:fld>
             <a:endParaRPr lang="hu-HU"/>
           </a:p>
@@ -2098,7 +2098,7 @@
           <a:p>
             <a:fld id="{7520FE40-B5E6-4F63-9BAB-DDB3402A48E9}" type="datetimeFigureOut">
               <a:rPr lang="hu-HU" smtClean="0"/>
-              <a:t>2024. 03. 30.</a:t>
+              <a:t>2024. 03. 31.</a:t>
             </a:fld>
             <a:endParaRPr lang="hu-HU"/>
           </a:p>
@@ -2355,7 +2355,7 @@
           <a:p>
             <a:fld id="{7520FE40-B5E6-4F63-9BAB-DDB3402A48E9}" type="datetimeFigureOut">
               <a:rPr lang="hu-HU" smtClean="0"/>
-              <a:t>2024. 03. 30.</a:t>
+              <a:t>2024. 03. 31.</a:t>
             </a:fld>
             <a:endParaRPr lang="hu-HU"/>
           </a:p>
@@ -2568,7 +2568,7 @@
           <a:p>
             <a:fld id="{7520FE40-B5E6-4F63-9BAB-DDB3402A48E9}" type="datetimeFigureOut">
               <a:rPr lang="hu-HU" smtClean="0"/>
-              <a:t>2024. 03. 30.</a:t>
+              <a:t>2024. 03. 31.</a:t>
             </a:fld>
             <a:endParaRPr lang="hu-HU"/>
           </a:p>
@@ -5089,42 +5089,6 @@
           </a:p>
         </p:txBody>
       </p:sp>
-      <p:sp>
-        <p:nvSpPr>
-          <p:cNvPr id="104" name="Szövegdoboz 103">
-            <a:extLst>
-              <a:ext uri="{FF2B5EF4-FFF2-40B4-BE49-F238E27FC236}">
-                <a16:creationId xmlns:a16="http://schemas.microsoft.com/office/drawing/2014/main" id="{F8358585-0A3B-19FF-5B50-C1C257C1793D}"/>
-              </a:ext>
-            </a:extLst>
-          </p:cNvPr>
-          <p:cNvSpPr txBox="1"/>
-          <p:nvPr/>
-        </p:nvSpPr>
-        <p:spPr>
-          <a:xfrm>
-            <a:off x="6463078" y="4307737"/>
-            <a:ext cx="691879" cy="261610"/>
-          </a:xfrm>
-          <a:prstGeom prst="rect">
-            <a:avLst/>
-          </a:prstGeom>
-          <a:noFill/>
-        </p:spPr>
-        <p:txBody>
-          <a:bodyPr wrap="square" rtlCol="0">
-            <a:spAutoFit/>
-          </a:bodyPr>
-          <a:lstStyle/>
-          <a:p>
-            <a:pPr algn="ctr"/>
-            <a:r>
-              <a:rPr lang="hu-HU" sz="1100" dirty="0"/>
-              <a:t>Mentés</a:t>
-            </a:r>
-          </a:p>
-        </p:txBody>
-      </p:sp>
       <p:pic>
         <p:nvPicPr>
           <p:cNvPr id="108" name="Kép 107" descr="A képen fekete, fehér, tervezés látható&#10;&#10;Automatikusan generált leírás">
@@ -6127,7 +6091,7 @@
         </p:blipFill>
         <p:spPr>
           <a:xfrm>
-            <a:off x="6865828" y="6729827"/>
+            <a:off x="4209430" y="4367131"/>
             <a:ext cx="2160000" cy="1620000"/>
           </a:xfrm>
           <a:prstGeom prst="rect">
@@ -6146,14 +6110,13 @@
           </p:cNvPr>
           <p:cNvCxnSpPr>
             <a:cxnSpLocks/>
-            <a:endCxn id="35" idx="3"/>
           </p:cNvCxnSpPr>
           <p:nvPr/>
         </p:nvCxnSpPr>
         <p:spPr>
           <a:xfrm flipH="1">
-            <a:off x="9025828" y="6217920"/>
-            <a:ext cx="635103" cy="1321907"/>
+            <a:off x="5832840" y="3536249"/>
+            <a:ext cx="1163524" cy="788440"/>
           </a:xfrm>
           <a:prstGeom prst="straightConnector1">
             <a:avLst/>
@@ -6182,10 +6145,10 @@
       </p:cxnSp>
       <p:sp>
         <p:nvSpPr>
-          <p:cNvPr id="39" name="Szabadkézi sokszög: alakzat 38">
+          <p:cNvPr id="43" name="Szabadkézi sokszög: alakzat 42">
             <a:extLst>
               <a:ext uri="{FF2B5EF4-FFF2-40B4-BE49-F238E27FC236}">
-                <a16:creationId xmlns:a16="http://schemas.microsoft.com/office/drawing/2014/main" id="{1D9B80F9-08EE-9C97-E120-EFA2AC8B685F}"/>
+                <a16:creationId xmlns:a16="http://schemas.microsoft.com/office/drawing/2014/main" id="{AE88D5CC-2C26-5631-96E9-B9E3B82B15C2}"/>
               </a:ext>
             </a:extLst>
           </p:cNvPr>
@@ -6194,192 +6157,8 @@
         </p:nvSpPr>
         <p:spPr>
           <a:xfrm>
-            <a:off x="8968740" y="6608366"/>
-            <a:ext cx="1102227" cy="577604"/>
-          </a:xfrm>
-          <a:custGeom>
-            <a:avLst/>
-            <a:gdLst>
-              <a:gd name="connsiteX0" fmla="*/ 0 w 1135380"/>
-              <a:gd name="connsiteY0" fmla="*/ 518160 h 556569"/>
-              <a:gd name="connsiteX1" fmla="*/ 662940 w 1135380"/>
-              <a:gd name="connsiteY1" fmla="*/ 502920 h 556569"/>
-              <a:gd name="connsiteX2" fmla="*/ 1135380 w 1135380"/>
-              <a:gd name="connsiteY2" fmla="*/ 0 h 556569"/>
-            </a:gdLst>
-            <a:ahLst/>
-            <a:cxnLst>
-              <a:cxn ang="0">
-                <a:pos x="connsiteX0" y="connsiteY0"/>
-              </a:cxn>
-              <a:cxn ang="0">
-                <a:pos x="connsiteX1" y="connsiteY1"/>
-              </a:cxn>
-              <a:cxn ang="0">
-                <a:pos x="connsiteX2" y="connsiteY2"/>
-              </a:cxn>
-            </a:cxnLst>
-            <a:rect l="l" t="t" r="r" b="b"/>
-            <a:pathLst>
-              <a:path w="1135380" h="556569">
-                <a:moveTo>
-                  <a:pt x="0" y="518160"/>
-                </a:moveTo>
-                <a:cubicBezTo>
-                  <a:pt x="236855" y="553720"/>
-                  <a:pt x="473710" y="589280"/>
-                  <a:pt x="662940" y="502920"/>
-                </a:cubicBezTo>
-                <a:cubicBezTo>
-                  <a:pt x="852170" y="416560"/>
-                  <a:pt x="993775" y="208280"/>
-                  <a:pt x="1135380" y="0"/>
-                </a:cubicBezTo>
-              </a:path>
-            </a:pathLst>
-          </a:custGeom>
-          <a:noFill/>
-          <a:ln w="38100">
-            <a:solidFill>
-              <a:srgbClr val="00FF00"/>
-            </a:solidFill>
-            <a:headEnd type="none" w="med" len="med"/>
-            <a:tailEnd type="triangle" w="med" len="med"/>
-          </a:ln>
-        </p:spPr>
-        <p:style>
-          <a:lnRef idx="2">
-            <a:schemeClr val="accent1">
-              <a:shade val="15000"/>
-            </a:schemeClr>
-          </a:lnRef>
-          <a:fillRef idx="1">
-            <a:schemeClr val="accent1"/>
-          </a:fillRef>
-          <a:effectRef idx="0">
-            <a:schemeClr val="accent1"/>
-          </a:effectRef>
-          <a:fontRef idx="minor">
-            <a:schemeClr val="lt1"/>
-          </a:fontRef>
-        </p:style>
-        <p:txBody>
-          <a:bodyPr rtlCol="0" anchor="ctr"/>
-          <a:lstStyle/>
-          <a:p>
-            <a:pPr algn="ctr"/>
-            <a:endParaRPr lang="hu-HU"/>
-          </a:p>
-        </p:txBody>
-      </p:sp>
-      <p:sp>
-        <p:nvSpPr>
-          <p:cNvPr id="42" name="Szabadkézi sokszög: alakzat 41">
-            <a:extLst>
-              <a:ext uri="{FF2B5EF4-FFF2-40B4-BE49-F238E27FC236}">
-                <a16:creationId xmlns:a16="http://schemas.microsoft.com/office/drawing/2014/main" id="{D19EDB4A-28B2-4ED9-FAD0-B2CBEE1B43B5}"/>
-              </a:ext>
-            </a:extLst>
-          </p:cNvPr>
-          <p:cNvSpPr/>
-          <p:nvPr/>
-        </p:nvSpPr>
-        <p:spPr>
-          <a:xfrm>
-            <a:off x="8884920" y="6263640"/>
-            <a:ext cx="304800" cy="487632"/>
-          </a:xfrm>
-          <a:custGeom>
-            <a:avLst/>
-            <a:gdLst>
-              <a:gd name="connsiteX0" fmla="*/ 0 w 304800"/>
-              <a:gd name="connsiteY0" fmla="*/ 457200 h 457200"/>
-              <a:gd name="connsiteX1" fmla="*/ 76200 w 304800"/>
-              <a:gd name="connsiteY1" fmla="*/ 167640 h 457200"/>
-              <a:gd name="connsiteX2" fmla="*/ 304800 w 304800"/>
-              <a:gd name="connsiteY2" fmla="*/ 0 h 457200"/>
-            </a:gdLst>
-            <a:ahLst/>
-            <a:cxnLst>
-              <a:cxn ang="0">
-                <a:pos x="connsiteX0" y="connsiteY0"/>
-              </a:cxn>
-              <a:cxn ang="0">
-                <a:pos x="connsiteX1" y="connsiteY1"/>
-              </a:cxn>
-              <a:cxn ang="0">
-                <a:pos x="connsiteX2" y="connsiteY2"/>
-              </a:cxn>
-            </a:cxnLst>
-            <a:rect l="l" t="t" r="r" b="b"/>
-            <a:pathLst>
-              <a:path w="304800" h="457200">
-                <a:moveTo>
-                  <a:pt x="0" y="457200"/>
-                </a:moveTo>
-                <a:cubicBezTo>
-                  <a:pt x="12700" y="350520"/>
-                  <a:pt x="25400" y="243840"/>
-                  <a:pt x="76200" y="167640"/>
-                </a:cubicBezTo>
-                <a:cubicBezTo>
-                  <a:pt x="127000" y="91440"/>
-                  <a:pt x="215900" y="45720"/>
-                  <a:pt x="304800" y="0"/>
-                </a:cubicBezTo>
-              </a:path>
-            </a:pathLst>
-          </a:custGeom>
-          <a:noFill/>
-          <a:ln w="76200">
-            <a:solidFill>
-              <a:srgbClr val="52E1E8"/>
-            </a:solidFill>
-            <a:headEnd type="none" w="med" len="med"/>
-            <a:tailEnd type="triangle" w="med" len="med"/>
-          </a:ln>
-        </p:spPr>
-        <p:style>
-          <a:lnRef idx="2">
-            <a:schemeClr val="accent1">
-              <a:shade val="15000"/>
-            </a:schemeClr>
-          </a:lnRef>
-          <a:fillRef idx="1">
-            <a:schemeClr val="accent1"/>
-          </a:fillRef>
-          <a:effectRef idx="0">
-            <a:schemeClr val="accent1"/>
-          </a:effectRef>
-          <a:fontRef idx="minor">
-            <a:schemeClr val="lt1"/>
-          </a:fontRef>
-        </p:style>
-        <p:txBody>
-          <a:bodyPr rtlCol="0" anchor="ctr"/>
-          <a:lstStyle/>
-          <a:p>
-            <a:pPr algn="ctr"/>
-            <a:endParaRPr lang="hu-HU"/>
-          </a:p>
-        </p:txBody>
-      </p:sp>
-      <p:sp>
-        <p:nvSpPr>
-          <p:cNvPr id="43" name="Szabadkézi sokszög: alakzat 42">
-            <a:extLst>
-              <a:ext uri="{FF2B5EF4-FFF2-40B4-BE49-F238E27FC236}">
-                <a16:creationId xmlns:a16="http://schemas.microsoft.com/office/drawing/2014/main" id="{AE88D5CC-2C26-5631-96E9-B9E3B82B15C2}"/>
-              </a:ext>
-            </a:extLst>
-          </p:cNvPr>
-          <p:cNvSpPr/>
-          <p:nvPr/>
-        </p:nvSpPr>
-        <p:spPr>
-          <a:xfrm>
-            <a:off x="8953500" y="6621780"/>
-            <a:ext cx="723900" cy="1508760"/>
+            <a:off x="6345063" y="3749180"/>
+            <a:ext cx="934842" cy="1973738"/>
           </a:xfrm>
           <a:custGeom>
             <a:avLst/>
@@ -6459,10 +6238,10 @@
       </p:sp>
       <p:sp>
         <p:nvSpPr>
-          <p:cNvPr id="44" name="Szövegdoboz 43">
+          <p:cNvPr id="46" name="Szövegdoboz 45">
             <a:extLst>
               <a:ext uri="{FF2B5EF4-FFF2-40B4-BE49-F238E27FC236}">
-                <a16:creationId xmlns:a16="http://schemas.microsoft.com/office/drawing/2014/main" id="{3F829947-D576-D921-8BD3-87E7F997DCBF}"/>
+                <a16:creationId xmlns:a16="http://schemas.microsoft.com/office/drawing/2014/main" id="{E8A77FC8-BB1F-6168-4DF3-14F634DC4352}"/>
               </a:ext>
             </a:extLst>
           </p:cNvPr>
@@ -6471,7 +6250,7 @@
         </p:nvSpPr>
         <p:spPr>
           <a:xfrm>
-            <a:off x="9663995" y="6698764"/>
+            <a:off x="6441401" y="5467973"/>
             <a:ext cx="691879" cy="261610"/>
           </a:xfrm>
           <a:prstGeom prst="rect">
@@ -6488,17 +6267,109 @@
             <a:pPr algn="ctr"/>
             <a:r>
               <a:rPr lang="hu-HU" sz="1100" dirty="0"/>
-              <a:t>Mentés</a:t>
-            </a:r>
-          </a:p>
-        </p:txBody>
-      </p:sp>
-      <p:sp>
-        <p:nvSpPr>
-          <p:cNvPr id="46" name="Szövegdoboz 45">
+              <a:t>Vissza</a:t>
+            </a:r>
+          </a:p>
+        </p:txBody>
+      </p:sp>
+      <p:sp>
+        <p:nvSpPr>
+          <p:cNvPr id="10" name="Szabadkézi sokszög: alakzat 9">
             <a:extLst>
               <a:ext uri="{FF2B5EF4-FFF2-40B4-BE49-F238E27FC236}">
-                <a16:creationId xmlns:a16="http://schemas.microsoft.com/office/drawing/2014/main" id="{E8A77FC8-BB1F-6168-4DF3-14F634DC4352}"/>
+                <a16:creationId xmlns:a16="http://schemas.microsoft.com/office/drawing/2014/main" id="{2675D2DE-3A9A-1DD0-885B-59422CB68356}"/>
+              </a:ext>
+            </a:extLst>
+          </p:cNvPr>
+          <p:cNvSpPr/>
+          <p:nvPr/>
+        </p:nvSpPr>
+        <p:spPr>
+          <a:xfrm>
+            <a:off x="6353175" y="3743325"/>
+            <a:ext cx="695325" cy="1132841"/>
+          </a:xfrm>
+          <a:custGeom>
+            <a:avLst/>
+            <a:gdLst>
+              <a:gd name="connsiteX0" fmla="*/ 0 w 695325"/>
+              <a:gd name="connsiteY0" fmla="*/ 1114425 h 1132841"/>
+              <a:gd name="connsiteX1" fmla="*/ 419100 w 695325"/>
+              <a:gd name="connsiteY1" fmla="*/ 981075 h 1132841"/>
+              <a:gd name="connsiteX2" fmla="*/ 695325 w 695325"/>
+              <a:gd name="connsiteY2" fmla="*/ 0 h 1132841"/>
+            </a:gdLst>
+            <a:ahLst/>
+            <a:cxnLst>
+              <a:cxn ang="0">
+                <a:pos x="connsiteX0" y="connsiteY0"/>
+              </a:cxn>
+              <a:cxn ang="0">
+                <a:pos x="connsiteX1" y="connsiteY1"/>
+              </a:cxn>
+              <a:cxn ang="0">
+                <a:pos x="connsiteX2" y="connsiteY2"/>
+              </a:cxn>
+            </a:cxnLst>
+            <a:rect l="l" t="t" r="r" b="b"/>
+            <a:pathLst>
+              <a:path w="695325" h="1132841">
+                <a:moveTo>
+                  <a:pt x="0" y="1114425"/>
+                </a:moveTo>
+                <a:cubicBezTo>
+                  <a:pt x="151606" y="1140618"/>
+                  <a:pt x="303213" y="1166812"/>
+                  <a:pt x="419100" y="981075"/>
+                </a:cubicBezTo>
+                <a:cubicBezTo>
+                  <a:pt x="534987" y="795338"/>
+                  <a:pt x="615156" y="397669"/>
+                  <a:pt x="695325" y="0"/>
+                </a:cubicBezTo>
+              </a:path>
+            </a:pathLst>
+          </a:custGeom>
+          <a:noFill/>
+          <a:ln w="38100">
+            <a:solidFill>
+              <a:srgbClr val="00FF00"/>
+            </a:solidFill>
+            <a:headEnd type="none" w="med" len="med"/>
+            <a:tailEnd type="triangle" w="med" len="med"/>
+          </a:ln>
+        </p:spPr>
+        <p:style>
+          <a:lnRef idx="2">
+            <a:schemeClr val="accent1">
+              <a:shade val="15000"/>
+            </a:schemeClr>
+          </a:lnRef>
+          <a:fillRef idx="1">
+            <a:schemeClr val="accent1"/>
+          </a:fillRef>
+          <a:effectRef idx="0">
+            <a:schemeClr val="accent1"/>
+          </a:effectRef>
+          <a:fontRef idx="minor">
+            <a:schemeClr val="lt1"/>
+          </a:fontRef>
+        </p:style>
+        <p:txBody>
+          <a:bodyPr rtlCol="0" anchor="ctr"/>
+          <a:lstStyle/>
+          <a:p>
+            <a:pPr algn="ctr"/>
+            <a:endParaRPr lang="hu-HU"/>
+          </a:p>
+        </p:txBody>
+      </p:sp>
+      <p:sp>
+        <p:nvSpPr>
+          <p:cNvPr id="104" name="Szövegdoboz 103">
+            <a:extLst>
+              <a:ext uri="{FF2B5EF4-FFF2-40B4-BE49-F238E27FC236}">
+                <a16:creationId xmlns:a16="http://schemas.microsoft.com/office/drawing/2014/main" id="{F8358585-0A3B-19FF-5B50-C1C257C1793D}"/>
               </a:ext>
             </a:extLst>
           </p:cNvPr>
@@ -6507,7 +6378,7 @@
         </p:nvSpPr>
         <p:spPr>
           <a:xfrm>
-            <a:off x="9049838" y="7875595"/>
+            <a:off x="6569122" y="4342492"/>
             <a:ext cx="691879" cy="261610"/>
           </a:xfrm>
           <a:prstGeom prst="rect">
@@ -6524,8 +6395,100 @@
             <a:pPr algn="ctr"/>
             <a:r>
               <a:rPr lang="hu-HU" sz="1100" dirty="0"/>
-              <a:t>Vissza</a:t>
-            </a:r>
+              <a:t>Mentés</a:t>
+            </a:r>
+          </a:p>
+        </p:txBody>
+      </p:sp>
+      <p:sp>
+        <p:nvSpPr>
+          <p:cNvPr id="15" name="Szabadkézi sokszög: alakzat 14">
+            <a:extLst>
+              <a:ext uri="{FF2B5EF4-FFF2-40B4-BE49-F238E27FC236}">
+                <a16:creationId xmlns:a16="http://schemas.microsoft.com/office/drawing/2014/main" id="{9476CBA0-7EC1-D9B4-F64D-000B98D405CC}"/>
+              </a:ext>
+            </a:extLst>
+          </p:cNvPr>
+          <p:cNvSpPr/>
+          <p:nvPr/>
+        </p:nvSpPr>
+        <p:spPr>
+          <a:xfrm>
+            <a:off x="6315074" y="3766983"/>
+            <a:ext cx="557879" cy="671668"/>
+          </a:xfrm>
+          <a:custGeom>
+            <a:avLst/>
+            <a:gdLst>
+              <a:gd name="connsiteX0" fmla="*/ 0 w 552450"/>
+              <a:gd name="connsiteY0" fmla="*/ 657225 h 657225"/>
+              <a:gd name="connsiteX1" fmla="*/ 333375 w 552450"/>
+              <a:gd name="connsiteY1" fmla="*/ 400050 h 657225"/>
+              <a:gd name="connsiteX2" fmla="*/ 552450 w 552450"/>
+              <a:gd name="connsiteY2" fmla="*/ 0 h 657225"/>
+            </a:gdLst>
+            <a:ahLst/>
+            <a:cxnLst>
+              <a:cxn ang="0">
+                <a:pos x="connsiteX0" y="connsiteY0"/>
+              </a:cxn>
+              <a:cxn ang="0">
+                <a:pos x="connsiteX1" y="connsiteY1"/>
+              </a:cxn>
+              <a:cxn ang="0">
+                <a:pos x="connsiteX2" y="connsiteY2"/>
+              </a:cxn>
+            </a:cxnLst>
+            <a:rect l="l" t="t" r="r" b="b"/>
+            <a:pathLst>
+              <a:path w="552450" h="657225">
+                <a:moveTo>
+                  <a:pt x="0" y="657225"/>
+                </a:moveTo>
+                <a:cubicBezTo>
+                  <a:pt x="120650" y="583406"/>
+                  <a:pt x="241300" y="509587"/>
+                  <a:pt x="333375" y="400050"/>
+                </a:cubicBezTo>
+                <a:cubicBezTo>
+                  <a:pt x="425450" y="290513"/>
+                  <a:pt x="488950" y="145256"/>
+                  <a:pt x="552450" y="0"/>
+                </a:cubicBezTo>
+              </a:path>
+            </a:pathLst>
+          </a:custGeom>
+          <a:noFill/>
+          <a:ln w="76200">
+            <a:solidFill>
+              <a:srgbClr val="52E1E8"/>
+            </a:solidFill>
+            <a:headEnd type="none" w="med" len="med"/>
+            <a:tailEnd type="triangle" w="med" len="med"/>
+          </a:ln>
+        </p:spPr>
+        <p:style>
+          <a:lnRef idx="2">
+            <a:schemeClr val="accent1">
+              <a:shade val="15000"/>
+            </a:schemeClr>
+          </a:lnRef>
+          <a:fillRef idx="1">
+            <a:schemeClr val="accent1"/>
+          </a:fillRef>
+          <a:effectRef idx="0">
+            <a:schemeClr val="accent1"/>
+          </a:effectRef>
+          <a:fontRef idx="minor">
+            <a:schemeClr val="lt1"/>
+          </a:fontRef>
+        </p:style>
+        <p:txBody>
+          <a:bodyPr rtlCol="0" anchor="ctr"/>
+          <a:lstStyle/>
+          <a:p>
+            <a:pPr algn="ctr"/>
+            <a:endParaRPr lang="hu-HU"/>
           </a:p>
         </p:txBody>
       </p:sp>
@@ -6543,7 +6506,7 @@
         </p:nvSpPr>
         <p:spPr>
           <a:xfrm>
-            <a:off x="8527957" y="6416917"/>
+            <a:off x="6173806" y="4108854"/>
             <a:ext cx="691879" cy="261610"/>
           </a:xfrm>
           <a:prstGeom prst="rect">

</xml_diff>

<commit_message>
Compacting and added circuit
</commit_message>
<xml_diff>
--- a/Menürendzser.pptx
+++ b/Menürendzser.pptx
@@ -6,6 +6,7 @@
   </p:sldMasterIdLst>
   <p:sldIdLst>
     <p:sldId id="256" r:id="rId2"/>
+    <p:sldId id="257" r:id="rId3"/>
   </p:sldIdLst>
   <p:sldSz cx="21599525" cy="10799763"/>
   <p:notesSz cx="6858000" cy="9144000"/>
@@ -243,7 +244,7 @@
           <a:p>
             <a:fld id="{7520FE40-B5E6-4F63-9BAB-DDB3402A48E9}" type="datetimeFigureOut">
               <a:rPr lang="hu-HU" smtClean="0"/>
-              <a:t>2024. 04. 02.</a:t>
+              <a:t>2024. 04. 03.</a:t>
             </a:fld>
             <a:endParaRPr lang="hu-HU"/>
           </a:p>
@@ -413,7 +414,7 @@
           <a:p>
             <a:fld id="{7520FE40-B5E6-4F63-9BAB-DDB3402A48E9}" type="datetimeFigureOut">
               <a:rPr lang="hu-HU" smtClean="0"/>
-              <a:t>2024. 04. 02.</a:t>
+              <a:t>2024. 04. 03.</a:t>
             </a:fld>
             <a:endParaRPr lang="hu-HU"/>
           </a:p>
@@ -593,7 +594,7 @@
           <a:p>
             <a:fld id="{7520FE40-B5E6-4F63-9BAB-DDB3402A48E9}" type="datetimeFigureOut">
               <a:rPr lang="hu-HU" smtClean="0"/>
-              <a:t>2024. 04. 02.</a:t>
+              <a:t>2024. 04. 03.</a:t>
             </a:fld>
             <a:endParaRPr lang="hu-HU"/>
           </a:p>
@@ -763,7 +764,7 @@
           <a:p>
             <a:fld id="{7520FE40-B5E6-4F63-9BAB-DDB3402A48E9}" type="datetimeFigureOut">
               <a:rPr lang="hu-HU" smtClean="0"/>
-              <a:t>2024. 04. 02.</a:t>
+              <a:t>2024. 04. 03.</a:t>
             </a:fld>
             <a:endParaRPr lang="hu-HU"/>
           </a:p>
@@ -1009,7 +1010,7 @@
           <a:p>
             <a:fld id="{7520FE40-B5E6-4F63-9BAB-DDB3402A48E9}" type="datetimeFigureOut">
               <a:rPr lang="hu-HU" smtClean="0"/>
-              <a:t>2024. 04. 02.</a:t>
+              <a:t>2024. 04. 03.</a:t>
             </a:fld>
             <a:endParaRPr lang="hu-HU"/>
           </a:p>
@@ -1241,7 +1242,7 @@
           <a:p>
             <a:fld id="{7520FE40-B5E6-4F63-9BAB-DDB3402A48E9}" type="datetimeFigureOut">
               <a:rPr lang="hu-HU" smtClean="0"/>
-              <a:t>2024. 04. 02.</a:t>
+              <a:t>2024. 04. 03.</a:t>
             </a:fld>
             <a:endParaRPr lang="hu-HU"/>
           </a:p>
@@ -1608,7 +1609,7 @@
           <a:p>
             <a:fld id="{7520FE40-B5E6-4F63-9BAB-DDB3402A48E9}" type="datetimeFigureOut">
               <a:rPr lang="hu-HU" smtClean="0"/>
-              <a:t>2024. 04. 02.</a:t>
+              <a:t>2024. 04. 03.</a:t>
             </a:fld>
             <a:endParaRPr lang="hu-HU"/>
           </a:p>
@@ -1726,7 +1727,7 @@
           <a:p>
             <a:fld id="{7520FE40-B5E6-4F63-9BAB-DDB3402A48E9}" type="datetimeFigureOut">
               <a:rPr lang="hu-HU" smtClean="0"/>
-              <a:t>2024. 04. 02.</a:t>
+              <a:t>2024. 04. 03.</a:t>
             </a:fld>
             <a:endParaRPr lang="hu-HU"/>
           </a:p>
@@ -1821,7 +1822,7 @@
           <a:p>
             <a:fld id="{7520FE40-B5E6-4F63-9BAB-DDB3402A48E9}" type="datetimeFigureOut">
               <a:rPr lang="hu-HU" smtClean="0"/>
-              <a:t>2024. 04. 02.</a:t>
+              <a:t>2024. 04. 03.</a:t>
             </a:fld>
             <a:endParaRPr lang="hu-HU"/>
           </a:p>
@@ -2098,7 +2099,7 @@
           <a:p>
             <a:fld id="{7520FE40-B5E6-4F63-9BAB-DDB3402A48E9}" type="datetimeFigureOut">
               <a:rPr lang="hu-HU" smtClean="0"/>
-              <a:t>2024. 04. 02.</a:t>
+              <a:t>2024. 04. 03.</a:t>
             </a:fld>
             <a:endParaRPr lang="hu-HU"/>
           </a:p>
@@ -2355,7 +2356,7 @@
           <a:p>
             <a:fld id="{7520FE40-B5E6-4F63-9BAB-DDB3402A48E9}" type="datetimeFigureOut">
               <a:rPr lang="hu-HU" smtClean="0"/>
-              <a:t>2024. 04. 02.</a:t>
+              <a:t>2024. 04. 03.</a:t>
             </a:fld>
             <a:endParaRPr lang="hu-HU"/>
           </a:p>
@@ -2568,7 +2569,7 @@
           <a:p>
             <a:fld id="{7520FE40-B5E6-4F63-9BAB-DDB3402A48E9}" type="datetimeFigureOut">
               <a:rPr lang="hu-HU" smtClean="0"/>
-              <a:t>2024. 04. 02.</a:t>
+              <a:t>2024. 04. 03.</a:t>
             </a:fld>
             <a:endParaRPr lang="hu-HU"/>
           </a:p>
@@ -7101,6 +7102,72 @@
 </p:sld>
 </file>
 
+<file path=ppt/slides/slide2.xml><?xml version="1.0" encoding="utf-8"?>
+<p:sld xmlns:a="http://schemas.openxmlformats.org/drawingml/2006/main" xmlns:r="http://schemas.openxmlformats.org/officeDocument/2006/relationships" xmlns:p="http://schemas.openxmlformats.org/presentationml/2006/main">
+  <p:cSld>
+    <p:spTree>
+      <p:nvGrpSpPr>
+        <p:cNvPr id="1" name=""/>
+        <p:cNvGrpSpPr/>
+        <p:nvPr/>
+      </p:nvGrpSpPr>
+      <p:grpSpPr>
+        <a:xfrm>
+          <a:off x="0" y="0"/>
+          <a:ext cx="0" cy="0"/>
+          <a:chOff x="0" y="0"/>
+          <a:chExt cx="0" cy="0"/>
+        </a:xfrm>
+      </p:grpSpPr>
+      <p:pic>
+        <p:nvPicPr>
+          <p:cNvPr id="4" name="Kép 3" descr="A képen szöveg, képernyőkép, Téglalap, áramkör látható&#10;&#10;Automatikusan generált leírás">
+            <a:extLst>
+              <a:ext uri="{FF2B5EF4-FFF2-40B4-BE49-F238E27FC236}">
+                <a16:creationId xmlns:a16="http://schemas.microsoft.com/office/drawing/2014/main" id="{6B37A525-32B8-5BBA-4A4B-BCD6D33B7CFA}"/>
+              </a:ext>
+            </a:extLst>
+          </p:cNvPr>
+          <p:cNvPicPr>
+            <a:picLocks noChangeAspect="1"/>
+          </p:cNvPicPr>
+          <p:nvPr/>
+        </p:nvPicPr>
+        <p:blipFill>
+          <a:blip r:embed="rId2">
+            <a:extLst>
+              <a:ext uri="{28A0092B-C50C-407E-A947-70E740481C1C}">
+                <a14:useLocalDpi xmlns:a14="http://schemas.microsoft.com/office/drawing/2010/main" val="0"/>
+              </a:ext>
+            </a:extLst>
+          </a:blip>
+          <a:stretch>
+            <a:fillRect/>
+          </a:stretch>
+        </p:blipFill>
+        <p:spPr>
+          <a:xfrm rot="16200000">
+            <a:off x="5399882" y="-2751530"/>
+            <a:ext cx="10799762" cy="16302822"/>
+          </a:xfrm>
+          <a:prstGeom prst="rect">
+            <a:avLst/>
+          </a:prstGeom>
+        </p:spPr>
+      </p:pic>
+    </p:spTree>
+    <p:extLst>
+      <p:ext uri="{BB962C8B-B14F-4D97-AF65-F5344CB8AC3E}">
+        <p14:creationId xmlns:p14="http://schemas.microsoft.com/office/powerpoint/2010/main" val="1164702274"/>
+      </p:ext>
+    </p:extLst>
+  </p:cSld>
+  <p:clrMapOvr>
+    <a:masterClrMapping/>
+  </p:clrMapOvr>
+</p:sld>
+</file>
+
 <file path=ppt/theme/theme1.xml><?xml version="1.0" encoding="utf-8"?>
 <a:theme xmlns:a="http://schemas.openxmlformats.org/drawingml/2006/main" name="Office-téma">
   <a:themeElements>

</xml_diff>